<commit_message>
Revert "pt2/lecture7 minor changes"
This reverts commit bd3d27c556d3afa78e592a6fb5874ed8f0a7d926.
</commit_message>
<xml_diff>
--- a/pt2/lectures/lecture7/lecture7.pptx
+++ b/pt2/lectures/lecture7/lecture7.pptx
@@ -5,30 +5,27 @@
     <p:sldMasterId id="2147483648" r:id="rId1"/>
     <p:sldMasterId id="2147483661" r:id="rId2"/>
   </p:sldMasterIdLst>
-  <p:notesMasterIdLst>
-    <p:notesMasterId r:id="rId26"/>
-  </p:notesMasterIdLst>
   <p:sldIdLst>
-    <p:sldId id="256" r:id="rId6"/>
-    <p:sldId id="257" r:id="rId7"/>
-    <p:sldId id="258" r:id="rId8"/>
-    <p:sldId id="259" r:id="rId9"/>
-    <p:sldId id="260" r:id="rId10"/>
-    <p:sldId id="261" r:id="rId11"/>
-    <p:sldId id="262" r:id="rId12"/>
-    <p:sldId id="263" r:id="rId13"/>
-    <p:sldId id="264" r:id="rId14"/>
-    <p:sldId id="265" r:id="rId15"/>
-    <p:sldId id="266" r:id="rId16"/>
-    <p:sldId id="267" r:id="rId17"/>
-    <p:sldId id="268" r:id="rId18"/>
-    <p:sldId id="269" r:id="rId19"/>
-    <p:sldId id="270" r:id="rId20"/>
-    <p:sldId id="271" r:id="rId21"/>
-    <p:sldId id="272" r:id="rId22"/>
-    <p:sldId id="273" r:id="rId23"/>
-    <p:sldId id="274" r:id="rId24"/>
-    <p:sldId id="275" r:id="rId25"/>
+    <p:sldId id="256" r:id="rId5"/>
+    <p:sldId id="257" r:id="rId6"/>
+    <p:sldId id="258" r:id="rId7"/>
+    <p:sldId id="259" r:id="rId8"/>
+    <p:sldId id="260" r:id="rId9"/>
+    <p:sldId id="261" r:id="rId10"/>
+    <p:sldId id="262" r:id="rId11"/>
+    <p:sldId id="263" r:id="rId12"/>
+    <p:sldId id="264" r:id="rId13"/>
+    <p:sldId id="265" r:id="rId14"/>
+    <p:sldId id="266" r:id="rId15"/>
+    <p:sldId id="267" r:id="rId16"/>
+    <p:sldId id="268" r:id="rId17"/>
+    <p:sldId id="269" r:id="rId18"/>
+    <p:sldId id="270" r:id="rId19"/>
+    <p:sldId id="271" r:id="rId20"/>
+    <p:sldId id="272" r:id="rId21"/>
+    <p:sldId id="273" r:id="rId22"/>
+    <p:sldId id="274" r:id="rId23"/>
+    <p:sldId id="275" r:id="rId24"/>
   </p:sldIdLst>
   <p:sldSz cx="12192000" cy="6858000"/>
   <p:notesSz cx="12192000" cy="6858000"/>
@@ -128,1966 +125,6 @@
     </a:lvl9pPr>
   </p:defaultTextStyle>
 </p:presentation>
-</file>
-
-<file path=ppt/notesMasters/notesMaster1.xml><?xml version="1.0" encoding="utf-8"?>
-<p:notesMaster xmlns:a="http://schemas.openxmlformats.org/drawingml/2006/main" xmlns:r="http://schemas.openxmlformats.org/officeDocument/2006/relationships" xmlns:p="http://schemas.openxmlformats.org/presentationml/2006/main">
-  <p:cSld name="">
-    <p:bg>
-      <p:bgRef idx="1001">
-        <a:schemeClr val="bg1"/>
-      </p:bgRef>
-    </p:bg>
-    <p:spTree>
-      <p:nvGrpSpPr>
-        <p:cNvPr id="1" name=""/>
-        <p:cNvGrpSpPr/>
-        <p:nvPr/>
-      </p:nvGrpSpPr>
-      <p:grpSpPr bwMode="auto">
-        <a:xfrm>
-          <a:off x="0" y="0"/>
-          <a:ext cx="0" cy="0"/>
-          <a:chOff x="0" y="0"/>
-          <a:chExt cx="0" cy="0"/>
-        </a:xfrm>
-      </p:grpSpPr>
-      <p:sp>
-        <p:nvSpPr>
-          <p:cNvPr id="2" name="Header Placeholder 1"/>
-          <p:cNvSpPr>
-            <a:spLocks noGrp="1"/>
-          </p:cNvSpPr>
-          <p:nvPr>
-            <p:ph type="hdr" sz="quarter"/>
-          </p:nvPr>
-        </p:nvSpPr>
-        <p:spPr bwMode="auto">
-          <a:xfrm>
-            <a:off x="0" y="0"/>
-            <a:ext cx="2971800" cy="458788"/>
-          </a:xfrm>
-          <a:prstGeom prst="rect">
-            <a:avLst/>
-          </a:prstGeom>
-        </p:spPr>
-        <p:txBody>
-          <a:bodyPr vert="horz" lIns="91440" tIns="45720" rIns="91440" bIns="45720" rtlCol="0" anchor="ctr"/>
-          <a:lstStyle>
-            <a:lvl1pPr algn="l">
-              <a:defRPr sz="1200"/>
-            </a:lvl1pPr>
-          </a:lstStyle>
-          <a:p>
-            <a:pPr>
-              <a:defRPr/>
-            </a:pPr>
-            <a:endParaRPr/>
-          </a:p>
-        </p:txBody>
-      </p:sp>
-      <p:sp>
-        <p:nvSpPr>
-          <p:cNvPr id="3" name="Date Placeholder 2"/>
-          <p:cNvSpPr>
-            <a:spLocks noGrp="1"/>
-          </p:cNvSpPr>
-          <p:nvPr>
-            <p:ph type="dt" idx="2"/>
-          </p:nvPr>
-        </p:nvSpPr>
-        <p:spPr bwMode="auto">
-          <a:xfrm>
-            <a:off x="3884613" y="0"/>
-            <a:ext cx="2971800" cy="458788"/>
-          </a:xfrm>
-          <a:prstGeom prst="rect">
-            <a:avLst/>
-          </a:prstGeom>
-        </p:spPr>
-        <p:txBody>
-          <a:bodyPr vert="horz" lIns="91440" tIns="45720" rIns="91440" bIns="45720" rtlCol="0" anchor="ctr"/>
-          <a:lstStyle>
-            <a:lvl1pPr algn="r">
-              <a:defRPr sz="1200"/>
-            </a:lvl1pPr>
-          </a:lstStyle>
-          <a:p>
-            <a:pPr>
-              <a:defRPr/>
-            </a:pPr>
-            <a:endParaRPr/>
-          </a:p>
-        </p:txBody>
-      </p:sp>
-      <p:sp>
-        <p:nvSpPr>
-          <p:cNvPr id="3" name="Date Placeholder 2"/>
-          <p:cNvSpPr>
-            <a:spLocks noGrp="1"/>
-          </p:cNvSpPr>
-          <p:nvPr>
-            <p:ph type="dt" idx="3"/>
-          </p:nvPr>
-        </p:nvSpPr>
-        <p:spPr bwMode="auto">
-          <a:xfrm>
-            <a:off x="3884613" y="0"/>
-            <a:ext cx="2971800" cy="458788"/>
-          </a:xfrm>
-          <a:prstGeom prst="rect">
-            <a:avLst/>
-          </a:prstGeom>
-        </p:spPr>
-        <p:txBody>
-          <a:bodyPr vert="horz" lIns="91440" tIns="45720" rIns="91440" bIns="45720" rtlCol="0" anchor="ctr"/>
-          <a:lstStyle>
-            <a:lvl1pPr algn="r">
-              <a:defRPr sz="1200"/>
-            </a:lvl1pPr>
-          </a:lstStyle>
-          <a:p>
-            <a:pPr>
-              <a:defRPr/>
-            </a:pPr>
-            <a:endParaRPr/>
-          </a:p>
-        </p:txBody>
-      </p:sp>
-      <p:sp>
-        <p:nvSpPr>
-          <p:cNvPr id="5" name="Notes Placeholder 4"/>
-          <p:cNvSpPr>
-            <a:spLocks noGrp="1"/>
-          </p:cNvSpPr>
-          <p:nvPr>
-            <p:ph type="body" sz="quarter" idx="1"/>
-          </p:nvPr>
-        </p:nvSpPr>
-        <p:spPr bwMode="auto">
-          <a:xfrm>
-            <a:off x="685800" y="4400550"/>
-            <a:ext cx="5486400" cy="3600450"/>
-          </a:xfrm>
-          <a:prstGeom prst="rect">
-            <a:avLst/>
-          </a:prstGeom>
-        </p:spPr>
-        <p:txBody>
-          <a:bodyPr vert="horz" lIns="91440" tIns="45720" rIns="91440" bIns="45720" rtlCol="0" anchor="ctr"/>
-          <a:lstStyle/>
-          <a:p>
-            <a:pPr>
-              <a:defRPr/>
-            </a:pPr>
-            <a:endParaRPr/>
-          </a:p>
-        </p:txBody>
-      </p:sp>
-      <p:sp>
-        <p:nvSpPr>
-          <p:cNvPr id="6" name="Footer Placeholder 5"/>
-          <p:cNvSpPr>
-            <a:spLocks noGrp="1"/>
-          </p:cNvSpPr>
-          <p:nvPr>
-            <p:ph type="ftr" sz="quarter" idx="4"/>
-          </p:nvPr>
-        </p:nvSpPr>
-        <p:spPr bwMode="auto">
-          <a:xfrm>
-            <a:off x="0" y="8685213"/>
-            <a:ext cx="2971800" cy="458787"/>
-          </a:xfrm>
-          <a:prstGeom prst="rect">
-            <a:avLst/>
-          </a:prstGeom>
-        </p:spPr>
-        <p:txBody>
-          <a:bodyPr vert="horz" lIns="91440" tIns="45720" rIns="91440" bIns="45720" rtlCol="0" anchor="b"/>
-          <a:lstStyle>
-            <a:lvl1pPr algn="l">
-              <a:defRPr sz="1200"/>
-            </a:lvl1pPr>
-          </a:lstStyle>
-          <a:p>
-            <a:pPr>
-              <a:defRPr/>
-            </a:pPr>
-            <a:endParaRPr/>
-          </a:p>
-        </p:txBody>
-      </p:sp>
-      <p:sp>
-        <p:nvSpPr>
-          <p:cNvPr id="7" name="Slide Number Placeholder 6"/>
-          <p:cNvSpPr>
-            <a:spLocks noGrp="1"/>
-          </p:cNvSpPr>
-          <p:nvPr>
-            <p:ph type="sldNum" sz="quarter" idx="10"/>
-          </p:nvPr>
-        </p:nvSpPr>
-        <p:spPr bwMode="auto">
-          <a:xfrm>
-            <a:off x="3884613" y="8685213"/>
-            <a:ext cx="2971800" cy="458787"/>
-          </a:xfrm>
-          <a:prstGeom prst="rect">
-            <a:avLst/>
-          </a:prstGeom>
-        </p:spPr>
-        <p:txBody>
-          <a:bodyPr vert="horz" lIns="91440" tIns="45720" rIns="91440" bIns="45720" rtlCol="0" anchor="b"/>
-          <a:lstStyle>
-            <a:lvl1pPr algn="r">
-              <a:defRPr sz="1200"/>
-            </a:lvl1pPr>
-          </a:lstStyle>
-          <a:p>
-            <a:pPr>
-              <a:defRPr/>
-            </a:pPr>
-            <a:endParaRPr/>
-          </a:p>
-        </p:txBody>
-      </p:sp>
-    </p:spTree>
-  </p:cSld>
-  <p:clrMap bg1="lt1" tx1="dk1" bg2="lt2" tx2="dk2" accent1="accent1" accent2="accent2" accent3="accent3" accent4="accent4" accent5="accent5" accent6="accent6" hlink="hlink" folHlink="folHlink"/>
-  <p:notesStyle>
-    <a:lvl1pPr marL="0" algn="l" defTabSz="914400">
-      <a:defRPr sz="1200">
-        <a:solidFill>
-          <a:schemeClr val="tx1"/>
-        </a:solidFill>
-        <a:latin typeface="+mn-lt"/>
-        <a:ea typeface="+mn-ea"/>
-        <a:cs typeface="+mn-cs"/>
-      </a:defRPr>
-    </a:lvl1pPr>
-    <a:lvl2pPr marL="457200" algn="l" defTabSz="914400">
-      <a:defRPr sz="1200">
-        <a:solidFill>
-          <a:schemeClr val="tx1"/>
-        </a:solidFill>
-        <a:latin typeface="+mn-lt"/>
-        <a:ea typeface="+mn-ea"/>
-        <a:cs typeface="+mn-cs"/>
-      </a:defRPr>
-    </a:lvl2pPr>
-    <a:lvl3pPr marL="914400" algn="l" defTabSz="914400">
-      <a:defRPr sz="1200">
-        <a:solidFill>
-          <a:schemeClr val="tx1"/>
-        </a:solidFill>
-        <a:latin typeface="+mn-lt"/>
-        <a:ea typeface="+mn-ea"/>
-        <a:cs typeface="+mn-cs"/>
-      </a:defRPr>
-    </a:lvl3pPr>
-    <a:lvl4pPr marL="1371600" algn="l" defTabSz="914400">
-      <a:defRPr sz="1200">
-        <a:solidFill>
-          <a:schemeClr val="tx1"/>
-        </a:solidFill>
-        <a:latin typeface="+mn-lt"/>
-        <a:ea typeface="+mn-ea"/>
-        <a:cs typeface="+mn-cs"/>
-      </a:defRPr>
-    </a:lvl4pPr>
-    <a:lvl5pPr marL="1828800" algn="l" defTabSz="914400">
-      <a:defRPr sz="1200">
-        <a:solidFill>
-          <a:schemeClr val="tx1"/>
-        </a:solidFill>
-        <a:latin typeface="+mn-lt"/>
-        <a:ea typeface="+mn-ea"/>
-        <a:cs typeface="+mn-cs"/>
-      </a:defRPr>
-    </a:lvl5pPr>
-    <a:lvl6pPr marL="2286000" algn="l" defTabSz="914400">
-      <a:defRPr sz="1200">
-        <a:solidFill>
-          <a:schemeClr val="tx1"/>
-        </a:solidFill>
-        <a:latin typeface="+mn-lt"/>
-        <a:ea typeface="+mn-ea"/>
-        <a:cs typeface="+mn-cs"/>
-      </a:defRPr>
-    </a:lvl6pPr>
-    <a:lvl7pPr marL="2743200" algn="l" defTabSz="914400">
-      <a:defRPr sz="1200">
-        <a:solidFill>
-          <a:schemeClr val="tx1"/>
-        </a:solidFill>
-        <a:latin typeface="+mn-lt"/>
-        <a:ea typeface="+mn-ea"/>
-        <a:cs typeface="+mn-cs"/>
-      </a:defRPr>
-    </a:lvl7pPr>
-    <a:lvl8pPr marL="3200400" algn="l" defTabSz="914400">
-      <a:defRPr sz="1200">
-        <a:solidFill>
-          <a:schemeClr val="tx1"/>
-        </a:solidFill>
-        <a:latin typeface="+mn-lt"/>
-        <a:ea typeface="+mn-ea"/>
-        <a:cs typeface="+mn-cs"/>
-      </a:defRPr>
-    </a:lvl8pPr>
-    <a:lvl9pPr marL="3657600" algn="l" defTabSz="914400">
-      <a:defRPr sz="1200">
-        <a:solidFill>
-          <a:schemeClr val="tx1"/>
-        </a:solidFill>
-        <a:latin typeface="+mn-lt"/>
-        <a:ea typeface="+mn-ea"/>
-        <a:cs typeface="+mn-cs"/>
-      </a:defRPr>
-    </a:lvl9pPr>
-  </p:notesStyle>
-</p:notesMaster>
-</file>
-
-<file path=ppt/notesSlides/notesSlide1.xml><?xml version="1.0" encoding="utf-8"?>
-<p:notes xmlns:a="http://schemas.openxmlformats.org/drawingml/2006/main" xmlns:r="http://schemas.openxmlformats.org/officeDocument/2006/relationships" xmlns:p="http://schemas.openxmlformats.org/presentationml/2006/main" xmlns:m="http://schemas.openxmlformats.org/officeDocument/2006/math" xmlns:w="http://schemas.openxmlformats.org/wordprocessingml/2006/main">
-  <p:cSld name="">
-    <p:spTree>
-      <p:nvGrpSpPr>
-        <p:cNvPr id="1" name=""/>
-        <p:cNvGrpSpPr/>
-        <p:nvPr/>
-      </p:nvGrpSpPr>
-      <p:grpSpPr bwMode="auto">
-        <a:xfrm>
-          <a:off x="0" y="0"/>
-          <a:ext cx="0" cy="0"/>
-          <a:chOff x="0" y="0"/>
-          <a:chExt cx="0" cy="0"/>
-        </a:xfrm>
-      </p:grpSpPr>
-      <p:sp>
-        <p:nvSpPr>
-          <p:cNvPr id="2" name="Slide Image Placeholder 1"/>
-          <p:cNvSpPr>
-            <a:spLocks noChangeAspect="1" noGrp="1" noRot="1"/>
-          </p:cNvSpPr>
-          <p:nvPr>
-            <p:ph type="sldImg"/>
-          </p:nvPr>
-        </p:nvSpPr>
-        <p:spPr bwMode="auto"/>
-      </p:sp>
-      <p:sp>
-        <p:nvSpPr>
-          <p:cNvPr id="3" name="Notes Placeholder 2"/>
-          <p:cNvSpPr>
-            <a:spLocks noGrp="1"/>
-          </p:cNvSpPr>
-          <p:nvPr>
-            <p:ph type="body" idx="1"/>
-          </p:nvPr>
-        </p:nvSpPr>
-        <p:spPr bwMode="auto"/>
-        <p:txBody>
-          <a:bodyPr/>
-          <a:lstStyle/>
-          <a:p>
-            <a:pPr>
-              <a:defRPr/>
-            </a:pPr>
-            <a:endParaRPr/>
-          </a:p>
-        </p:txBody>
-      </p:sp>
-      <p:sp>
-        <p:nvSpPr>
-          <p:cNvPr id="4" name="Slide Number Placeholder 3"/>
-          <p:cNvSpPr>
-            <a:spLocks noGrp="1"/>
-          </p:cNvSpPr>
-          <p:nvPr>
-            <p:ph type="sldNum" sz="quarter" idx="10"/>
-          </p:nvPr>
-        </p:nvSpPr>
-        <p:spPr bwMode="auto"/>
-        <p:txBody>
-          <a:bodyPr/>
-          <a:lstStyle/>
-          <a:p>
-            <a:pPr>
-              <a:defRPr/>
-            </a:pPr>
-            <a:fld id="{CEA38B15-ED43-FF83-34B7-2EA1ACF35243}" type="slidenum">
-              <a:rPr/>
-              <a:t/>
-            </a:fld>
-            <a:endParaRPr/>
-          </a:p>
-        </p:txBody>
-      </p:sp>
-    </p:spTree>
-  </p:cSld>
-</p:notes>
-</file>
-
-<file path=ppt/notesSlides/notesSlide10.xml><?xml version="1.0" encoding="utf-8"?>
-<p:notes xmlns:a="http://schemas.openxmlformats.org/drawingml/2006/main" xmlns:r="http://schemas.openxmlformats.org/officeDocument/2006/relationships" xmlns:p="http://schemas.openxmlformats.org/presentationml/2006/main" xmlns:m="http://schemas.openxmlformats.org/officeDocument/2006/math" xmlns:w="http://schemas.openxmlformats.org/wordprocessingml/2006/main">
-  <p:cSld name="">
-    <p:spTree>
-      <p:nvGrpSpPr>
-        <p:cNvPr id="1" name=""/>
-        <p:cNvGrpSpPr/>
-        <p:nvPr/>
-      </p:nvGrpSpPr>
-      <p:grpSpPr bwMode="auto">
-        <a:xfrm>
-          <a:off x="0" y="0"/>
-          <a:ext cx="0" cy="0"/>
-          <a:chOff x="0" y="0"/>
-          <a:chExt cx="0" cy="0"/>
-        </a:xfrm>
-      </p:grpSpPr>
-      <p:sp>
-        <p:nvSpPr>
-          <p:cNvPr id="2" name="Slide Image Placeholder 1"/>
-          <p:cNvSpPr>
-            <a:spLocks noChangeAspect="1" noGrp="1" noRot="1"/>
-          </p:cNvSpPr>
-          <p:nvPr>
-            <p:ph type="sldImg"/>
-          </p:nvPr>
-        </p:nvSpPr>
-        <p:spPr bwMode="auto"/>
-      </p:sp>
-      <p:sp>
-        <p:nvSpPr>
-          <p:cNvPr id="3" name="Notes Placeholder 2"/>
-          <p:cNvSpPr>
-            <a:spLocks noGrp="1"/>
-          </p:cNvSpPr>
-          <p:nvPr>
-            <p:ph type="body" idx="1"/>
-          </p:nvPr>
-        </p:nvSpPr>
-        <p:spPr bwMode="auto"/>
-        <p:txBody>
-          <a:bodyPr/>
-          <a:lstStyle/>
-          <a:p>
-            <a:pPr>
-              <a:defRPr/>
-            </a:pPr>
-            <a:endParaRPr/>
-          </a:p>
-        </p:txBody>
-      </p:sp>
-      <p:sp>
-        <p:nvSpPr>
-          <p:cNvPr id="4" name="Slide Number Placeholder 3"/>
-          <p:cNvSpPr>
-            <a:spLocks noGrp="1"/>
-          </p:cNvSpPr>
-          <p:nvPr>
-            <p:ph type="sldNum" sz="quarter" idx="10"/>
-          </p:nvPr>
-        </p:nvSpPr>
-        <p:spPr bwMode="auto"/>
-        <p:txBody>
-          <a:bodyPr/>
-          <a:lstStyle/>
-          <a:p>
-            <a:pPr>
-              <a:defRPr/>
-            </a:pPr>
-            <a:fld id="{24DC2356-DFBA-8B34-F0D8-0762B5745BE5}" type="slidenum">
-              <a:rPr/>
-              <a:t/>
-            </a:fld>
-            <a:endParaRPr/>
-          </a:p>
-        </p:txBody>
-      </p:sp>
-    </p:spTree>
-  </p:cSld>
-</p:notes>
-</file>
-
-<file path=ppt/notesSlides/notesSlide11.xml><?xml version="1.0" encoding="utf-8"?>
-<p:notes xmlns:a="http://schemas.openxmlformats.org/drawingml/2006/main" xmlns:r="http://schemas.openxmlformats.org/officeDocument/2006/relationships" xmlns:p="http://schemas.openxmlformats.org/presentationml/2006/main" xmlns:m="http://schemas.openxmlformats.org/officeDocument/2006/math" xmlns:w="http://schemas.openxmlformats.org/wordprocessingml/2006/main">
-  <p:cSld name="">
-    <p:spTree>
-      <p:nvGrpSpPr>
-        <p:cNvPr id="1" name=""/>
-        <p:cNvGrpSpPr/>
-        <p:nvPr/>
-      </p:nvGrpSpPr>
-      <p:grpSpPr bwMode="auto">
-        <a:xfrm>
-          <a:off x="0" y="0"/>
-          <a:ext cx="0" cy="0"/>
-          <a:chOff x="0" y="0"/>
-          <a:chExt cx="0" cy="0"/>
-        </a:xfrm>
-      </p:grpSpPr>
-      <p:sp>
-        <p:nvSpPr>
-          <p:cNvPr id="2" name="Slide Image Placeholder 1"/>
-          <p:cNvSpPr>
-            <a:spLocks noChangeAspect="1" noGrp="1" noRot="1"/>
-          </p:cNvSpPr>
-          <p:nvPr>
-            <p:ph type="sldImg"/>
-          </p:nvPr>
-        </p:nvSpPr>
-        <p:spPr bwMode="auto"/>
-      </p:sp>
-      <p:sp>
-        <p:nvSpPr>
-          <p:cNvPr id="3" name="Notes Placeholder 2"/>
-          <p:cNvSpPr>
-            <a:spLocks noGrp="1"/>
-          </p:cNvSpPr>
-          <p:nvPr>
-            <p:ph type="body" idx="1"/>
-          </p:nvPr>
-        </p:nvSpPr>
-        <p:spPr bwMode="auto"/>
-        <p:txBody>
-          <a:bodyPr/>
-          <a:lstStyle/>
-          <a:p>
-            <a:pPr>
-              <a:defRPr/>
-            </a:pPr>
-            <a:endParaRPr/>
-          </a:p>
-        </p:txBody>
-      </p:sp>
-      <p:sp>
-        <p:nvSpPr>
-          <p:cNvPr id="4" name="Slide Number Placeholder 3"/>
-          <p:cNvSpPr>
-            <a:spLocks noGrp="1"/>
-          </p:cNvSpPr>
-          <p:nvPr>
-            <p:ph type="sldNum" sz="quarter" idx="10"/>
-          </p:nvPr>
-        </p:nvSpPr>
-        <p:spPr bwMode="auto"/>
-        <p:txBody>
-          <a:bodyPr/>
-          <a:lstStyle/>
-          <a:p>
-            <a:pPr>
-              <a:defRPr/>
-            </a:pPr>
-            <a:fld id="{7FE68DCF-51B0-8DDF-FB73-9C1CB860F86B}" type="slidenum">
-              <a:rPr/>
-              <a:t/>
-            </a:fld>
-            <a:endParaRPr/>
-          </a:p>
-        </p:txBody>
-      </p:sp>
-    </p:spTree>
-  </p:cSld>
-</p:notes>
-</file>
-
-<file path=ppt/notesSlides/notesSlide12.xml><?xml version="1.0" encoding="utf-8"?>
-<p:notes xmlns:a="http://schemas.openxmlformats.org/drawingml/2006/main" xmlns:r="http://schemas.openxmlformats.org/officeDocument/2006/relationships" xmlns:p="http://schemas.openxmlformats.org/presentationml/2006/main" xmlns:m="http://schemas.openxmlformats.org/officeDocument/2006/math" xmlns:w="http://schemas.openxmlformats.org/wordprocessingml/2006/main">
-  <p:cSld name="">
-    <p:spTree>
-      <p:nvGrpSpPr>
-        <p:cNvPr id="1" name=""/>
-        <p:cNvGrpSpPr/>
-        <p:nvPr/>
-      </p:nvGrpSpPr>
-      <p:grpSpPr bwMode="auto">
-        <a:xfrm>
-          <a:off x="0" y="0"/>
-          <a:ext cx="0" cy="0"/>
-          <a:chOff x="0" y="0"/>
-          <a:chExt cx="0" cy="0"/>
-        </a:xfrm>
-      </p:grpSpPr>
-      <p:sp>
-        <p:nvSpPr>
-          <p:cNvPr id="2" name="Slide Image Placeholder 1"/>
-          <p:cNvSpPr>
-            <a:spLocks noChangeAspect="1" noGrp="1" noRot="1"/>
-          </p:cNvSpPr>
-          <p:nvPr>
-            <p:ph type="sldImg"/>
-          </p:nvPr>
-        </p:nvSpPr>
-        <p:spPr bwMode="auto"/>
-      </p:sp>
-      <p:sp>
-        <p:nvSpPr>
-          <p:cNvPr id="3" name="Notes Placeholder 2"/>
-          <p:cNvSpPr>
-            <a:spLocks noGrp="1"/>
-          </p:cNvSpPr>
-          <p:nvPr>
-            <p:ph type="body" idx="1"/>
-          </p:nvPr>
-        </p:nvSpPr>
-        <p:spPr bwMode="auto"/>
-        <p:txBody>
-          <a:bodyPr/>
-          <a:lstStyle/>
-          <a:p>
-            <a:pPr>
-              <a:defRPr/>
-            </a:pPr>
-            <a:endParaRPr/>
-          </a:p>
-        </p:txBody>
-      </p:sp>
-      <p:sp>
-        <p:nvSpPr>
-          <p:cNvPr id="4" name="Slide Number Placeholder 3"/>
-          <p:cNvSpPr>
-            <a:spLocks noGrp="1"/>
-          </p:cNvSpPr>
-          <p:nvPr>
-            <p:ph type="sldNum" sz="quarter" idx="10"/>
-          </p:nvPr>
-        </p:nvSpPr>
-        <p:spPr bwMode="auto"/>
-        <p:txBody>
-          <a:bodyPr/>
-          <a:lstStyle/>
-          <a:p>
-            <a:pPr>
-              <a:defRPr/>
-            </a:pPr>
-            <a:fld id="{3949D3AD-1C37-840F-7BA1-2A6003AE2DDA}" type="slidenum">
-              <a:rPr/>
-              <a:t/>
-            </a:fld>
-            <a:endParaRPr/>
-          </a:p>
-        </p:txBody>
-      </p:sp>
-    </p:spTree>
-  </p:cSld>
-</p:notes>
-</file>
-
-<file path=ppt/notesSlides/notesSlide13.xml><?xml version="1.0" encoding="utf-8"?>
-<p:notes xmlns:a="http://schemas.openxmlformats.org/drawingml/2006/main" xmlns:r="http://schemas.openxmlformats.org/officeDocument/2006/relationships" xmlns:p="http://schemas.openxmlformats.org/presentationml/2006/main" xmlns:m="http://schemas.openxmlformats.org/officeDocument/2006/math" xmlns:w="http://schemas.openxmlformats.org/wordprocessingml/2006/main">
-  <p:cSld name="">
-    <p:spTree>
-      <p:nvGrpSpPr>
-        <p:cNvPr id="1" name=""/>
-        <p:cNvGrpSpPr/>
-        <p:nvPr/>
-      </p:nvGrpSpPr>
-      <p:grpSpPr bwMode="auto">
-        <a:xfrm>
-          <a:off x="0" y="0"/>
-          <a:ext cx="0" cy="0"/>
-          <a:chOff x="0" y="0"/>
-          <a:chExt cx="0" cy="0"/>
-        </a:xfrm>
-      </p:grpSpPr>
-      <p:sp>
-        <p:nvSpPr>
-          <p:cNvPr id="2" name="Slide Image Placeholder 1"/>
-          <p:cNvSpPr>
-            <a:spLocks noChangeAspect="1" noGrp="1" noRot="1"/>
-          </p:cNvSpPr>
-          <p:nvPr>
-            <p:ph type="sldImg"/>
-          </p:nvPr>
-        </p:nvSpPr>
-        <p:spPr bwMode="auto"/>
-      </p:sp>
-      <p:sp>
-        <p:nvSpPr>
-          <p:cNvPr id="3" name="Notes Placeholder 2"/>
-          <p:cNvSpPr>
-            <a:spLocks noGrp="1"/>
-          </p:cNvSpPr>
-          <p:nvPr>
-            <p:ph type="body" idx="1"/>
-          </p:nvPr>
-        </p:nvSpPr>
-        <p:spPr bwMode="auto"/>
-        <p:txBody>
-          <a:bodyPr/>
-          <a:lstStyle/>
-          <a:p>
-            <a:pPr>
-              <a:defRPr/>
-            </a:pPr>
-            <a:endParaRPr/>
-          </a:p>
-        </p:txBody>
-      </p:sp>
-      <p:sp>
-        <p:nvSpPr>
-          <p:cNvPr id="4" name="Slide Number Placeholder 3"/>
-          <p:cNvSpPr>
-            <a:spLocks noGrp="1"/>
-          </p:cNvSpPr>
-          <p:nvPr>
-            <p:ph type="sldNum" sz="quarter" idx="10"/>
-          </p:nvPr>
-        </p:nvSpPr>
-        <p:spPr bwMode="auto"/>
-        <p:txBody>
-          <a:bodyPr/>
-          <a:lstStyle/>
-          <a:p>
-            <a:pPr>
-              <a:defRPr/>
-            </a:pPr>
-            <a:fld id="{11221CFE-371A-6F70-14CC-6C659325FE7F}" type="slidenum">
-              <a:rPr/>
-              <a:t/>
-            </a:fld>
-            <a:endParaRPr/>
-          </a:p>
-        </p:txBody>
-      </p:sp>
-    </p:spTree>
-  </p:cSld>
-</p:notes>
-</file>
-
-<file path=ppt/notesSlides/notesSlide14.xml><?xml version="1.0" encoding="utf-8"?>
-<p:notes xmlns:a="http://schemas.openxmlformats.org/drawingml/2006/main" xmlns:r="http://schemas.openxmlformats.org/officeDocument/2006/relationships" xmlns:p="http://schemas.openxmlformats.org/presentationml/2006/main" xmlns:m="http://schemas.openxmlformats.org/officeDocument/2006/math" xmlns:w="http://schemas.openxmlformats.org/wordprocessingml/2006/main">
-  <p:cSld name="">
-    <p:spTree>
-      <p:nvGrpSpPr>
-        <p:cNvPr id="1" name=""/>
-        <p:cNvGrpSpPr/>
-        <p:nvPr/>
-      </p:nvGrpSpPr>
-      <p:grpSpPr bwMode="auto">
-        <a:xfrm>
-          <a:off x="0" y="0"/>
-          <a:ext cx="0" cy="0"/>
-          <a:chOff x="0" y="0"/>
-          <a:chExt cx="0" cy="0"/>
-        </a:xfrm>
-      </p:grpSpPr>
-      <p:sp>
-        <p:nvSpPr>
-          <p:cNvPr id="2" name="Slide Image Placeholder 1"/>
-          <p:cNvSpPr>
-            <a:spLocks noChangeAspect="1" noGrp="1" noRot="1"/>
-          </p:cNvSpPr>
-          <p:nvPr>
-            <p:ph type="sldImg"/>
-          </p:nvPr>
-        </p:nvSpPr>
-        <p:spPr bwMode="auto"/>
-      </p:sp>
-      <p:sp>
-        <p:nvSpPr>
-          <p:cNvPr id="3" name="Notes Placeholder 2"/>
-          <p:cNvSpPr>
-            <a:spLocks noGrp="1"/>
-          </p:cNvSpPr>
-          <p:nvPr>
-            <p:ph type="body" idx="1"/>
-          </p:nvPr>
-        </p:nvSpPr>
-        <p:spPr bwMode="auto"/>
-        <p:txBody>
-          <a:bodyPr/>
-          <a:lstStyle/>
-          <a:p>
-            <a:pPr>
-              <a:defRPr/>
-            </a:pPr>
-            <a:endParaRPr/>
-          </a:p>
-        </p:txBody>
-      </p:sp>
-      <p:sp>
-        <p:nvSpPr>
-          <p:cNvPr id="4" name="Slide Number Placeholder 3"/>
-          <p:cNvSpPr>
-            <a:spLocks noGrp="1"/>
-          </p:cNvSpPr>
-          <p:nvPr>
-            <p:ph type="sldNum" sz="quarter" idx="10"/>
-          </p:nvPr>
-        </p:nvSpPr>
-        <p:spPr bwMode="auto"/>
-        <p:txBody>
-          <a:bodyPr/>
-          <a:lstStyle/>
-          <a:p>
-            <a:pPr>
-              <a:defRPr/>
-            </a:pPr>
-            <a:fld id="{9811CD7C-1A51-BEFC-BD81-C06A2F179FF9}" type="slidenum">
-              <a:rPr/>
-              <a:t/>
-            </a:fld>
-            <a:endParaRPr/>
-          </a:p>
-        </p:txBody>
-      </p:sp>
-    </p:spTree>
-  </p:cSld>
-</p:notes>
-</file>
-
-<file path=ppt/notesSlides/notesSlide15.xml><?xml version="1.0" encoding="utf-8"?>
-<p:notes xmlns:a="http://schemas.openxmlformats.org/drawingml/2006/main" xmlns:r="http://schemas.openxmlformats.org/officeDocument/2006/relationships" xmlns:p="http://schemas.openxmlformats.org/presentationml/2006/main" xmlns:m="http://schemas.openxmlformats.org/officeDocument/2006/math" xmlns:w="http://schemas.openxmlformats.org/wordprocessingml/2006/main">
-  <p:cSld name="">
-    <p:spTree>
-      <p:nvGrpSpPr>
-        <p:cNvPr id="1" name=""/>
-        <p:cNvGrpSpPr/>
-        <p:nvPr/>
-      </p:nvGrpSpPr>
-      <p:grpSpPr bwMode="auto">
-        <a:xfrm>
-          <a:off x="0" y="0"/>
-          <a:ext cx="0" cy="0"/>
-          <a:chOff x="0" y="0"/>
-          <a:chExt cx="0" cy="0"/>
-        </a:xfrm>
-      </p:grpSpPr>
-      <p:sp>
-        <p:nvSpPr>
-          <p:cNvPr id="2" name="Slide Image Placeholder 1"/>
-          <p:cNvSpPr>
-            <a:spLocks noChangeAspect="1" noGrp="1" noRot="1"/>
-          </p:cNvSpPr>
-          <p:nvPr>
-            <p:ph type="sldImg"/>
-          </p:nvPr>
-        </p:nvSpPr>
-        <p:spPr bwMode="auto"/>
-      </p:sp>
-      <p:sp>
-        <p:nvSpPr>
-          <p:cNvPr id="3" name="Notes Placeholder 2"/>
-          <p:cNvSpPr>
-            <a:spLocks noGrp="1"/>
-          </p:cNvSpPr>
-          <p:nvPr>
-            <p:ph type="body" idx="1"/>
-          </p:nvPr>
-        </p:nvSpPr>
-        <p:spPr bwMode="auto"/>
-        <p:txBody>
-          <a:bodyPr/>
-          <a:lstStyle/>
-          <a:p>
-            <a:pPr>
-              <a:defRPr/>
-            </a:pPr>
-            <a:endParaRPr/>
-          </a:p>
-        </p:txBody>
-      </p:sp>
-      <p:sp>
-        <p:nvSpPr>
-          <p:cNvPr id="4" name="Slide Number Placeholder 3"/>
-          <p:cNvSpPr>
-            <a:spLocks noGrp="1"/>
-          </p:cNvSpPr>
-          <p:nvPr>
-            <p:ph type="sldNum" sz="quarter" idx="10"/>
-          </p:nvPr>
-        </p:nvSpPr>
-        <p:spPr bwMode="auto"/>
-        <p:txBody>
-          <a:bodyPr/>
-          <a:lstStyle/>
-          <a:p>
-            <a:pPr>
-              <a:defRPr/>
-            </a:pPr>
-            <a:fld id="{17764137-6D72-2FDB-6767-F1FDC6980F5B}" type="slidenum">
-              <a:rPr/>
-              <a:t/>
-            </a:fld>
-            <a:endParaRPr/>
-          </a:p>
-        </p:txBody>
-      </p:sp>
-    </p:spTree>
-  </p:cSld>
-</p:notes>
-</file>
-
-<file path=ppt/notesSlides/notesSlide16.xml><?xml version="1.0" encoding="utf-8"?>
-<p:notes xmlns:a="http://schemas.openxmlformats.org/drawingml/2006/main" xmlns:r="http://schemas.openxmlformats.org/officeDocument/2006/relationships" xmlns:p="http://schemas.openxmlformats.org/presentationml/2006/main" xmlns:m="http://schemas.openxmlformats.org/officeDocument/2006/math" xmlns:w="http://schemas.openxmlformats.org/wordprocessingml/2006/main">
-  <p:cSld name="">
-    <p:spTree>
-      <p:nvGrpSpPr>
-        <p:cNvPr id="1" name=""/>
-        <p:cNvGrpSpPr/>
-        <p:nvPr/>
-      </p:nvGrpSpPr>
-      <p:grpSpPr bwMode="auto">
-        <a:xfrm>
-          <a:off x="0" y="0"/>
-          <a:ext cx="0" cy="0"/>
-          <a:chOff x="0" y="0"/>
-          <a:chExt cx="0" cy="0"/>
-        </a:xfrm>
-      </p:grpSpPr>
-      <p:sp>
-        <p:nvSpPr>
-          <p:cNvPr id="2" name="Slide Image Placeholder 1"/>
-          <p:cNvSpPr>
-            <a:spLocks noChangeAspect="1" noGrp="1" noRot="1"/>
-          </p:cNvSpPr>
-          <p:nvPr>
-            <p:ph type="sldImg"/>
-          </p:nvPr>
-        </p:nvSpPr>
-        <p:spPr bwMode="auto"/>
-      </p:sp>
-      <p:sp>
-        <p:nvSpPr>
-          <p:cNvPr id="3" name="Notes Placeholder 2"/>
-          <p:cNvSpPr>
-            <a:spLocks noGrp="1"/>
-          </p:cNvSpPr>
-          <p:nvPr>
-            <p:ph type="body" idx="1"/>
-          </p:nvPr>
-        </p:nvSpPr>
-        <p:spPr bwMode="auto"/>
-        <p:txBody>
-          <a:bodyPr/>
-          <a:lstStyle/>
-          <a:p>
-            <a:pPr>
-              <a:defRPr/>
-            </a:pPr>
-            <a:endParaRPr/>
-          </a:p>
-        </p:txBody>
-      </p:sp>
-      <p:sp>
-        <p:nvSpPr>
-          <p:cNvPr id="4" name="Slide Number Placeholder 3"/>
-          <p:cNvSpPr>
-            <a:spLocks noGrp="1"/>
-          </p:cNvSpPr>
-          <p:nvPr>
-            <p:ph type="sldNum" sz="quarter" idx="10"/>
-          </p:nvPr>
-        </p:nvSpPr>
-        <p:spPr bwMode="auto"/>
-        <p:txBody>
-          <a:bodyPr/>
-          <a:lstStyle/>
-          <a:p>
-            <a:pPr>
-              <a:defRPr/>
-            </a:pPr>
-            <a:fld id="{05597ED5-92F7-E8E7-4021-9AD5BF3C7CDA}" type="slidenum">
-              <a:rPr/>
-              <a:t/>
-            </a:fld>
-            <a:endParaRPr/>
-          </a:p>
-        </p:txBody>
-      </p:sp>
-    </p:spTree>
-  </p:cSld>
-</p:notes>
-</file>
-
-<file path=ppt/notesSlides/notesSlide17.xml><?xml version="1.0" encoding="utf-8"?>
-<p:notes xmlns:a="http://schemas.openxmlformats.org/drawingml/2006/main" xmlns:r="http://schemas.openxmlformats.org/officeDocument/2006/relationships" xmlns:p="http://schemas.openxmlformats.org/presentationml/2006/main" xmlns:m="http://schemas.openxmlformats.org/officeDocument/2006/math" xmlns:w="http://schemas.openxmlformats.org/wordprocessingml/2006/main">
-  <p:cSld name="">
-    <p:spTree>
-      <p:nvGrpSpPr>
-        <p:cNvPr id="1" name=""/>
-        <p:cNvGrpSpPr/>
-        <p:nvPr/>
-      </p:nvGrpSpPr>
-      <p:grpSpPr bwMode="auto">
-        <a:xfrm>
-          <a:off x="0" y="0"/>
-          <a:ext cx="0" cy="0"/>
-          <a:chOff x="0" y="0"/>
-          <a:chExt cx="0" cy="0"/>
-        </a:xfrm>
-      </p:grpSpPr>
-      <p:sp>
-        <p:nvSpPr>
-          <p:cNvPr id="2" name="Slide Image Placeholder 1"/>
-          <p:cNvSpPr>
-            <a:spLocks noChangeAspect="1" noGrp="1" noRot="1"/>
-          </p:cNvSpPr>
-          <p:nvPr>
-            <p:ph type="sldImg"/>
-          </p:nvPr>
-        </p:nvSpPr>
-        <p:spPr bwMode="auto"/>
-      </p:sp>
-      <p:sp>
-        <p:nvSpPr>
-          <p:cNvPr id="3" name="Notes Placeholder 2"/>
-          <p:cNvSpPr>
-            <a:spLocks noGrp="1"/>
-          </p:cNvSpPr>
-          <p:nvPr>
-            <p:ph type="body" idx="1"/>
-          </p:nvPr>
-        </p:nvSpPr>
-        <p:spPr bwMode="auto"/>
-        <p:txBody>
-          <a:bodyPr/>
-          <a:lstStyle/>
-          <a:p>
-            <a:pPr>
-              <a:defRPr/>
-            </a:pPr>
-            <a:endParaRPr/>
-          </a:p>
-        </p:txBody>
-      </p:sp>
-      <p:sp>
-        <p:nvSpPr>
-          <p:cNvPr id="4" name="Slide Number Placeholder 3"/>
-          <p:cNvSpPr>
-            <a:spLocks noGrp="1"/>
-          </p:cNvSpPr>
-          <p:nvPr>
-            <p:ph type="sldNum" sz="quarter" idx="10"/>
-          </p:nvPr>
-        </p:nvSpPr>
-        <p:spPr bwMode="auto"/>
-        <p:txBody>
-          <a:bodyPr/>
-          <a:lstStyle/>
-          <a:p>
-            <a:pPr>
-              <a:defRPr/>
-            </a:pPr>
-            <a:fld id="{590094C1-44AF-E061-5B98-01DE8ABF2255}" type="slidenum">
-              <a:rPr/>
-              <a:t/>
-            </a:fld>
-            <a:endParaRPr/>
-          </a:p>
-        </p:txBody>
-      </p:sp>
-    </p:spTree>
-  </p:cSld>
-</p:notes>
-</file>
-
-<file path=ppt/notesSlides/notesSlide18.xml><?xml version="1.0" encoding="utf-8"?>
-<p:notes xmlns:a="http://schemas.openxmlformats.org/drawingml/2006/main" xmlns:r="http://schemas.openxmlformats.org/officeDocument/2006/relationships" xmlns:p="http://schemas.openxmlformats.org/presentationml/2006/main" xmlns:m="http://schemas.openxmlformats.org/officeDocument/2006/math" xmlns:w="http://schemas.openxmlformats.org/wordprocessingml/2006/main">
-  <p:cSld name="">
-    <p:spTree>
-      <p:nvGrpSpPr>
-        <p:cNvPr id="1" name=""/>
-        <p:cNvGrpSpPr/>
-        <p:nvPr/>
-      </p:nvGrpSpPr>
-      <p:grpSpPr bwMode="auto">
-        <a:xfrm>
-          <a:off x="0" y="0"/>
-          <a:ext cx="0" cy="0"/>
-          <a:chOff x="0" y="0"/>
-          <a:chExt cx="0" cy="0"/>
-        </a:xfrm>
-      </p:grpSpPr>
-      <p:sp>
-        <p:nvSpPr>
-          <p:cNvPr id="2" name="Slide Image Placeholder 1"/>
-          <p:cNvSpPr>
-            <a:spLocks noChangeAspect="1" noGrp="1" noRot="1"/>
-          </p:cNvSpPr>
-          <p:nvPr>
-            <p:ph type="sldImg"/>
-          </p:nvPr>
-        </p:nvSpPr>
-        <p:spPr bwMode="auto"/>
-      </p:sp>
-      <p:sp>
-        <p:nvSpPr>
-          <p:cNvPr id="3" name="Notes Placeholder 2"/>
-          <p:cNvSpPr>
-            <a:spLocks noGrp="1"/>
-          </p:cNvSpPr>
-          <p:nvPr>
-            <p:ph type="body" idx="1"/>
-          </p:nvPr>
-        </p:nvSpPr>
-        <p:spPr bwMode="auto"/>
-        <p:txBody>
-          <a:bodyPr/>
-          <a:lstStyle/>
-          <a:p>
-            <a:pPr>
-              <a:defRPr/>
-            </a:pPr>
-            <a:endParaRPr/>
-          </a:p>
-        </p:txBody>
-      </p:sp>
-      <p:sp>
-        <p:nvSpPr>
-          <p:cNvPr id="4" name="Slide Number Placeholder 3"/>
-          <p:cNvSpPr>
-            <a:spLocks noGrp="1"/>
-          </p:cNvSpPr>
-          <p:nvPr>
-            <p:ph type="sldNum" sz="quarter" idx="10"/>
-          </p:nvPr>
-        </p:nvSpPr>
-        <p:spPr bwMode="auto"/>
-        <p:txBody>
-          <a:bodyPr/>
-          <a:lstStyle/>
-          <a:p>
-            <a:pPr>
-              <a:defRPr/>
-            </a:pPr>
-            <a:fld id="{1ACBB05E-6421-906D-950D-DD27E4FE7B99}" type="slidenum">
-              <a:rPr/>
-              <a:t/>
-            </a:fld>
-            <a:endParaRPr/>
-          </a:p>
-        </p:txBody>
-      </p:sp>
-    </p:spTree>
-  </p:cSld>
-</p:notes>
-</file>
-
-<file path=ppt/notesSlides/notesSlide19.xml><?xml version="1.0" encoding="utf-8"?>
-<p:notes xmlns:a="http://schemas.openxmlformats.org/drawingml/2006/main" xmlns:r="http://schemas.openxmlformats.org/officeDocument/2006/relationships" xmlns:p="http://schemas.openxmlformats.org/presentationml/2006/main" xmlns:m="http://schemas.openxmlformats.org/officeDocument/2006/math" xmlns:w="http://schemas.openxmlformats.org/wordprocessingml/2006/main">
-  <p:cSld name="">
-    <p:spTree>
-      <p:nvGrpSpPr>
-        <p:cNvPr id="1" name=""/>
-        <p:cNvGrpSpPr/>
-        <p:nvPr/>
-      </p:nvGrpSpPr>
-      <p:grpSpPr bwMode="auto">
-        <a:xfrm>
-          <a:off x="0" y="0"/>
-          <a:ext cx="0" cy="0"/>
-          <a:chOff x="0" y="0"/>
-          <a:chExt cx="0" cy="0"/>
-        </a:xfrm>
-      </p:grpSpPr>
-      <p:sp>
-        <p:nvSpPr>
-          <p:cNvPr id="2" name="Slide Image Placeholder 1"/>
-          <p:cNvSpPr>
-            <a:spLocks noChangeAspect="1" noGrp="1" noRot="1"/>
-          </p:cNvSpPr>
-          <p:nvPr>
-            <p:ph type="sldImg"/>
-          </p:nvPr>
-        </p:nvSpPr>
-        <p:spPr bwMode="auto"/>
-      </p:sp>
-      <p:sp>
-        <p:nvSpPr>
-          <p:cNvPr id="3" name="Notes Placeholder 2"/>
-          <p:cNvSpPr>
-            <a:spLocks noGrp="1"/>
-          </p:cNvSpPr>
-          <p:nvPr>
-            <p:ph type="body" idx="1"/>
-          </p:nvPr>
-        </p:nvSpPr>
-        <p:spPr bwMode="auto"/>
-        <p:txBody>
-          <a:bodyPr/>
-          <a:lstStyle/>
-          <a:p>
-            <a:pPr>
-              <a:defRPr/>
-            </a:pPr>
-            <a:endParaRPr/>
-          </a:p>
-        </p:txBody>
-      </p:sp>
-      <p:sp>
-        <p:nvSpPr>
-          <p:cNvPr id="4" name="Slide Number Placeholder 3"/>
-          <p:cNvSpPr>
-            <a:spLocks noGrp="1"/>
-          </p:cNvSpPr>
-          <p:nvPr>
-            <p:ph type="sldNum" sz="quarter" idx="10"/>
-          </p:nvPr>
-        </p:nvSpPr>
-        <p:spPr bwMode="auto"/>
-        <p:txBody>
-          <a:bodyPr/>
-          <a:lstStyle/>
-          <a:p>
-            <a:pPr>
-              <a:defRPr/>
-            </a:pPr>
-            <a:fld id="{12A8EDF0-FDE1-86BA-7464-AE65D06A6F7A}" type="slidenum">
-              <a:rPr/>
-              <a:t/>
-            </a:fld>
-            <a:endParaRPr/>
-          </a:p>
-        </p:txBody>
-      </p:sp>
-    </p:spTree>
-  </p:cSld>
-</p:notes>
-</file>
-
-<file path=ppt/notesSlides/notesSlide2.xml><?xml version="1.0" encoding="utf-8"?>
-<p:notes xmlns:a="http://schemas.openxmlformats.org/drawingml/2006/main" xmlns:r="http://schemas.openxmlformats.org/officeDocument/2006/relationships" xmlns:p="http://schemas.openxmlformats.org/presentationml/2006/main" xmlns:m="http://schemas.openxmlformats.org/officeDocument/2006/math" xmlns:w="http://schemas.openxmlformats.org/wordprocessingml/2006/main">
-  <p:cSld name="">
-    <p:spTree>
-      <p:nvGrpSpPr>
-        <p:cNvPr id="1" name=""/>
-        <p:cNvGrpSpPr/>
-        <p:nvPr/>
-      </p:nvGrpSpPr>
-      <p:grpSpPr bwMode="auto">
-        <a:xfrm>
-          <a:off x="0" y="0"/>
-          <a:ext cx="0" cy="0"/>
-          <a:chOff x="0" y="0"/>
-          <a:chExt cx="0" cy="0"/>
-        </a:xfrm>
-      </p:grpSpPr>
-      <p:sp>
-        <p:nvSpPr>
-          <p:cNvPr id="2" name="Slide Image Placeholder 1"/>
-          <p:cNvSpPr>
-            <a:spLocks noChangeAspect="1" noGrp="1" noRot="1"/>
-          </p:cNvSpPr>
-          <p:nvPr>
-            <p:ph type="sldImg"/>
-          </p:nvPr>
-        </p:nvSpPr>
-        <p:spPr bwMode="auto"/>
-      </p:sp>
-      <p:sp>
-        <p:nvSpPr>
-          <p:cNvPr id="3" name="Notes Placeholder 2"/>
-          <p:cNvSpPr>
-            <a:spLocks noGrp="1"/>
-          </p:cNvSpPr>
-          <p:nvPr>
-            <p:ph type="body" idx="1"/>
-          </p:nvPr>
-        </p:nvSpPr>
-        <p:spPr bwMode="auto"/>
-        <p:txBody>
-          <a:bodyPr/>
-          <a:lstStyle/>
-          <a:p>
-            <a:pPr>
-              <a:defRPr/>
-            </a:pPr>
-            <a:endParaRPr/>
-          </a:p>
-        </p:txBody>
-      </p:sp>
-      <p:sp>
-        <p:nvSpPr>
-          <p:cNvPr id="4" name="Slide Number Placeholder 3"/>
-          <p:cNvSpPr>
-            <a:spLocks noGrp="1"/>
-          </p:cNvSpPr>
-          <p:nvPr>
-            <p:ph type="sldNum" sz="quarter" idx="10"/>
-          </p:nvPr>
-        </p:nvSpPr>
-        <p:spPr bwMode="auto"/>
-        <p:txBody>
-          <a:bodyPr/>
-          <a:lstStyle/>
-          <a:p>
-            <a:pPr>
-              <a:defRPr/>
-            </a:pPr>
-            <a:fld id="{521DC30E-8E4C-4F66-0121-A6A235EE331C}" type="slidenum">
-              <a:rPr/>
-              <a:t/>
-            </a:fld>
-            <a:endParaRPr/>
-          </a:p>
-        </p:txBody>
-      </p:sp>
-    </p:spTree>
-  </p:cSld>
-</p:notes>
-</file>
-
-<file path=ppt/notesSlides/notesSlide20.xml><?xml version="1.0" encoding="utf-8"?>
-<p:notes xmlns:a="http://schemas.openxmlformats.org/drawingml/2006/main" xmlns:r="http://schemas.openxmlformats.org/officeDocument/2006/relationships" xmlns:p="http://schemas.openxmlformats.org/presentationml/2006/main" xmlns:m="http://schemas.openxmlformats.org/officeDocument/2006/math" xmlns:w="http://schemas.openxmlformats.org/wordprocessingml/2006/main">
-  <p:cSld name="">
-    <p:spTree>
-      <p:nvGrpSpPr>
-        <p:cNvPr id="1" name=""/>
-        <p:cNvGrpSpPr/>
-        <p:nvPr/>
-      </p:nvGrpSpPr>
-      <p:grpSpPr bwMode="auto">
-        <a:xfrm>
-          <a:off x="0" y="0"/>
-          <a:ext cx="0" cy="0"/>
-          <a:chOff x="0" y="0"/>
-          <a:chExt cx="0" cy="0"/>
-        </a:xfrm>
-      </p:grpSpPr>
-      <p:sp>
-        <p:nvSpPr>
-          <p:cNvPr id="2" name="Slide Image Placeholder 1"/>
-          <p:cNvSpPr>
-            <a:spLocks noChangeAspect="1" noGrp="1" noRot="1"/>
-          </p:cNvSpPr>
-          <p:nvPr>
-            <p:ph type="sldImg"/>
-          </p:nvPr>
-        </p:nvSpPr>
-        <p:spPr bwMode="auto"/>
-      </p:sp>
-      <p:sp>
-        <p:nvSpPr>
-          <p:cNvPr id="3" name="Notes Placeholder 2"/>
-          <p:cNvSpPr>
-            <a:spLocks noGrp="1"/>
-          </p:cNvSpPr>
-          <p:nvPr>
-            <p:ph type="body" idx="1"/>
-          </p:nvPr>
-        </p:nvSpPr>
-        <p:spPr bwMode="auto"/>
-        <p:txBody>
-          <a:bodyPr/>
-          <a:lstStyle/>
-          <a:p>
-            <a:pPr>
-              <a:defRPr/>
-            </a:pPr>
-            <a:endParaRPr/>
-          </a:p>
-        </p:txBody>
-      </p:sp>
-      <p:sp>
-        <p:nvSpPr>
-          <p:cNvPr id="4" name="Slide Number Placeholder 3"/>
-          <p:cNvSpPr>
-            <a:spLocks noGrp="1"/>
-          </p:cNvSpPr>
-          <p:nvPr>
-            <p:ph type="sldNum" sz="quarter" idx="10"/>
-          </p:nvPr>
-        </p:nvSpPr>
-        <p:spPr bwMode="auto"/>
-        <p:txBody>
-          <a:bodyPr/>
-          <a:lstStyle/>
-          <a:p>
-            <a:pPr>
-              <a:defRPr/>
-            </a:pPr>
-            <a:fld id="{C316FA0C-9E0B-D03F-CA90-8DE714490ED3}" type="slidenum">
-              <a:rPr/>
-              <a:t/>
-            </a:fld>
-            <a:endParaRPr/>
-          </a:p>
-        </p:txBody>
-      </p:sp>
-    </p:spTree>
-  </p:cSld>
-</p:notes>
-</file>
-
-<file path=ppt/notesSlides/notesSlide3.xml><?xml version="1.0" encoding="utf-8"?>
-<p:notes xmlns:a="http://schemas.openxmlformats.org/drawingml/2006/main" xmlns:r="http://schemas.openxmlformats.org/officeDocument/2006/relationships" xmlns:p="http://schemas.openxmlformats.org/presentationml/2006/main" xmlns:m="http://schemas.openxmlformats.org/officeDocument/2006/math" xmlns:w="http://schemas.openxmlformats.org/wordprocessingml/2006/main">
-  <p:cSld name="">
-    <p:spTree>
-      <p:nvGrpSpPr>
-        <p:cNvPr id="1" name=""/>
-        <p:cNvGrpSpPr/>
-        <p:nvPr/>
-      </p:nvGrpSpPr>
-      <p:grpSpPr bwMode="auto">
-        <a:xfrm>
-          <a:off x="0" y="0"/>
-          <a:ext cx="0" cy="0"/>
-          <a:chOff x="0" y="0"/>
-          <a:chExt cx="0" cy="0"/>
-        </a:xfrm>
-      </p:grpSpPr>
-      <p:sp>
-        <p:nvSpPr>
-          <p:cNvPr id="2" name="Slide Image Placeholder 1"/>
-          <p:cNvSpPr>
-            <a:spLocks noChangeAspect="1" noGrp="1" noRot="1"/>
-          </p:cNvSpPr>
-          <p:nvPr>
-            <p:ph type="sldImg"/>
-          </p:nvPr>
-        </p:nvSpPr>
-        <p:spPr bwMode="auto"/>
-      </p:sp>
-      <p:sp>
-        <p:nvSpPr>
-          <p:cNvPr id="3" name="Notes Placeholder 2"/>
-          <p:cNvSpPr>
-            <a:spLocks noGrp="1"/>
-          </p:cNvSpPr>
-          <p:nvPr>
-            <p:ph type="body" idx="1"/>
-          </p:nvPr>
-        </p:nvSpPr>
-        <p:spPr bwMode="auto"/>
-        <p:txBody>
-          <a:bodyPr/>
-          <a:lstStyle/>
-          <a:p>
-            <a:pPr>
-              <a:defRPr/>
-            </a:pPr>
-            <a:endParaRPr/>
-          </a:p>
-        </p:txBody>
-      </p:sp>
-      <p:sp>
-        <p:nvSpPr>
-          <p:cNvPr id="4" name="Slide Number Placeholder 3"/>
-          <p:cNvSpPr>
-            <a:spLocks noGrp="1"/>
-          </p:cNvSpPr>
-          <p:nvPr>
-            <p:ph type="sldNum" sz="quarter" idx="10"/>
-          </p:nvPr>
-        </p:nvSpPr>
-        <p:spPr bwMode="auto"/>
-        <p:txBody>
-          <a:bodyPr/>
-          <a:lstStyle/>
-          <a:p>
-            <a:pPr>
-              <a:defRPr/>
-            </a:pPr>
-            <a:fld id="{374FBB36-A557-D2C8-50EB-006003E92F29}" type="slidenum">
-              <a:rPr/>
-              <a:t/>
-            </a:fld>
-            <a:endParaRPr/>
-          </a:p>
-        </p:txBody>
-      </p:sp>
-    </p:spTree>
-  </p:cSld>
-</p:notes>
-</file>
-
-<file path=ppt/notesSlides/notesSlide4.xml><?xml version="1.0" encoding="utf-8"?>
-<p:notes xmlns:a="http://schemas.openxmlformats.org/drawingml/2006/main" xmlns:r="http://schemas.openxmlformats.org/officeDocument/2006/relationships" xmlns:p="http://schemas.openxmlformats.org/presentationml/2006/main" xmlns:m="http://schemas.openxmlformats.org/officeDocument/2006/math" xmlns:w="http://schemas.openxmlformats.org/wordprocessingml/2006/main">
-  <p:cSld name="">
-    <p:spTree>
-      <p:nvGrpSpPr>
-        <p:cNvPr id="1" name=""/>
-        <p:cNvGrpSpPr/>
-        <p:nvPr/>
-      </p:nvGrpSpPr>
-      <p:grpSpPr bwMode="auto">
-        <a:xfrm>
-          <a:off x="0" y="0"/>
-          <a:ext cx="0" cy="0"/>
-          <a:chOff x="0" y="0"/>
-          <a:chExt cx="0" cy="0"/>
-        </a:xfrm>
-      </p:grpSpPr>
-      <p:sp>
-        <p:nvSpPr>
-          <p:cNvPr id="2" name="Slide Image Placeholder 1"/>
-          <p:cNvSpPr>
-            <a:spLocks noChangeAspect="1" noGrp="1" noRot="1"/>
-          </p:cNvSpPr>
-          <p:nvPr>
-            <p:ph type="sldImg"/>
-          </p:nvPr>
-        </p:nvSpPr>
-        <p:spPr bwMode="auto"/>
-      </p:sp>
-      <p:sp>
-        <p:nvSpPr>
-          <p:cNvPr id="3" name="Notes Placeholder 2"/>
-          <p:cNvSpPr>
-            <a:spLocks noGrp="1"/>
-          </p:cNvSpPr>
-          <p:nvPr>
-            <p:ph type="body" idx="1"/>
-          </p:nvPr>
-        </p:nvSpPr>
-        <p:spPr bwMode="auto"/>
-        <p:txBody>
-          <a:bodyPr/>
-          <a:lstStyle/>
-          <a:p>
-            <a:pPr>
-              <a:defRPr/>
-            </a:pPr>
-            <a:endParaRPr/>
-          </a:p>
-        </p:txBody>
-      </p:sp>
-      <p:sp>
-        <p:nvSpPr>
-          <p:cNvPr id="4" name="Slide Number Placeholder 3"/>
-          <p:cNvSpPr>
-            <a:spLocks noGrp="1"/>
-          </p:cNvSpPr>
-          <p:nvPr>
-            <p:ph type="sldNum" sz="quarter" idx="10"/>
-          </p:nvPr>
-        </p:nvSpPr>
-        <p:spPr bwMode="auto"/>
-        <p:txBody>
-          <a:bodyPr/>
-          <a:lstStyle/>
-          <a:p>
-            <a:pPr>
-              <a:defRPr/>
-            </a:pPr>
-            <a:fld id="{12AD03D6-9775-DD01-9D69-2AB665A7BCF1}" type="slidenum">
-              <a:rPr/>
-              <a:t/>
-            </a:fld>
-            <a:endParaRPr/>
-          </a:p>
-        </p:txBody>
-      </p:sp>
-    </p:spTree>
-  </p:cSld>
-</p:notes>
-</file>
-
-<file path=ppt/notesSlides/notesSlide5.xml><?xml version="1.0" encoding="utf-8"?>
-<p:notes xmlns:a="http://schemas.openxmlformats.org/drawingml/2006/main" xmlns:r="http://schemas.openxmlformats.org/officeDocument/2006/relationships" xmlns:p="http://schemas.openxmlformats.org/presentationml/2006/main" xmlns:m="http://schemas.openxmlformats.org/officeDocument/2006/math" xmlns:w="http://schemas.openxmlformats.org/wordprocessingml/2006/main">
-  <p:cSld name="">
-    <p:spTree>
-      <p:nvGrpSpPr>
-        <p:cNvPr id="1" name=""/>
-        <p:cNvGrpSpPr/>
-        <p:nvPr/>
-      </p:nvGrpSpPr>
-      <p:grpSpPr bwMode="auto">
-        <a:xfrm>
-          <a:off x="0" y="0"/>
-          <a:ext cx="0" cy="0"/>
-          <a:chOff x="0" y="0"/>
-          <a:chExt cx="0" cy="0"/>
-        </a:xfrm>
-      </p:grpSpPr>
-      <p:sp>
-        <p:nvSpPr>
-          <p:cNvPr id="2" name="Slide Image Placeholder 1"/>
-          <p:cNvSpPr>
-            <a:spLocks noChangeAspect="1" noGrp="1" noRot="1"/>
-          </p:cNvSpPr>
-          <p:nvPr>
-            <p:ph type="sldImg"/>
-          </p:nvPr>
-        </p:nvSpPr>
-        <p:spPr bwMode="auto"/>
-      </p:sp>
-      <p:sp>
-        <p:nvSpPr>
-          <p:cNvPr id="3" name="Notes Placeholder 2"/>
-          <p:cNvSpPr>
-            <a:spLocks noGrp="1"/>
-          </p:cNvSpPr>
-          <p:nvPr>
-            <p:ph type="body" idx="1"/>
-          </p:nvPr>
-        </p:nvSpPr>
-        <p:spPr bwMode="auto"/>
-        <p:txBody>
-          <a:bodyPr/>
-          <a:lstStyle/>
-          <a:p>
-            <a:pPr>
-              <a:defRPr/>
-            </a:pPr>
-            <a:endParaRPr/>
-          </a:p>
-        </p:txBody>
-      </p:sp>
-      <p:sp>
-        <p:nvSpPr>
-          <p:cNvPr id="4" name="Slide Number Placeholder 3"/>
-          <p:cNvSpPr>
-            <a:spLocks noGrp="1"/>
-          </p:cNvSpPr>
-          <p:nvPr>
-            <p:ph type="sldNum" sz="quarter" idx="10"/>
-          </p:nvPr>
-        </p:nvSpPr>
-        <p:spPr bwMode="auto"/>
-        <p:txBody>
-          <a:bodyPr/>
-          <a:lstStyle/>
-          <a:p>
-            <a:pPr>
-              <a:defRPr/>
-            </a:pPr>
-            <a:fld id="{89C08029-D1EE-8F2E-A8CF-C9C8786B3EFB}" type="slidenum">
-              <a:rPr/>
-              <a:t/>
-            </a:fld>
-            <a:endParaRPr/>
-          </a:p>
-        </p:txBody>
-      </p:sp>
-    </p:spTree>
-  </p:cSld>
-</p:notes>
-</file>
-
-<file path=ppt/notesSlides/notesSlide6.xml><?xml version="1.0" encoding="utf-8"?>
-<p:notes xmlns:a="http://schemas.openxmlformats.org/drawingml/2006/main" xmlns:r="http://schemas.openxmlformats.org/officeDocument/2006/relationships" xmlns:p="http://schemas.openxmlformats.org/presentationml/2006/main" xmlns:m="http://schemas.openxmlformats.org/officeDocument/2006/math" xmlns:w="http://schemas.openxmlformats.org/wordprocessingml/2006/main">
-  <p:cSld name="">
-    <p:spTree>
-      <p:nvGrpSpPr>
-        <p:cNvPr id="1" name=""/>
-        <p:cNvGrpSpPr/>
-        <p:nvPr/>
-      </p:nvGrpSpPr>
-      <p:grpSpPr bwMode="auto">
-        <a:xfrm>
-          <a:off x="0" y="0"/>
-          <a:ext cx="0" cy="0"/>
-          <a:chOff x="0" y="0"/>
-          <a:chExt cx="0" cy="0"/>
-        </a:xfrm>
-      </p:grpSpPr>
-      <p:sp>
-        <p:nvSpPr>
-          <p:cNvPr id="2" name="Slide Image Placeholder 1"/>
-          <p:cNvSpPr>
-            <a:spLocks noChangeAspect="1" noGrp="1" noRot="1"/>
-          </p:cNvSpPr>
-          <p:nvPr>
-            <p:ph type="sldImg"/>
-          </p:nvPr>
-        </p:nvSpPr>
-        <p:spPr bwMode="auto"/>
-      </p:sp>
-      <p:sp>
-        <p:nvSpPr>
-          <p:cNvPr id="3" name="Notes Placeholder 2"/>
-          <p:cNvSpPr>
-            <a:spLocks noGrp="1"/>
-          </p:cNvSpPr>
-          <p:nvPr>
-            <p:ph type="body" idx="1"/>
-          </p:nvPr>
-        </p:nvSpPr>
-        <p:spPr bwMode="auto"/>
-        <p:txBody>
-          <a:bodyPr/>
-          <a:lstStyle/>
-          <a:p>
-            <a:pPr>
-              <a:defRPr/>
-            </a:pPr>
-            <a:endParaRPr/>
-          </a:p>
-        </p:txBody>
-      </p:sp>
-      <p:sp>
-        <p:nvSpPr>
-          <p:cNvPr id="4" name="Slide Number Placeholder 3"/>
-          <p:cNvSpPr>
-            <a:spLocks noGrp="1"/>
-          </p:cNvSpPr>
-          <p:nvPr>
-            <p:ph type="sldNum" sz="quarter" idx="10"/>
-          </p:nvPr>
-        </p:nvSpPr>
-        <p:spPr bwMode="auto"/>
-        <p:txBody>
-          <a:bodyPr/>
-          <a:lstStyle/>
-          <a:p>
-            <a:pPr>
-              <a:defRPr/>
-            </a:pPr>
-            <a:fld id="{8E9F634C-5A28-7E3C-9ED6-AB35FA467F36}" type="slidenum">
-              <a:rPr/>
-              <a:t/>
-            </a:fld>
-            <a:endParaRPr/>
-          </a:p>
-        </p:txBody>
-      </p:sp>
-    </p:spTree>
-  </p:cSld>
-</p:notes>
-</file>
-
-<file path=ppt/notesSlides/notesSlide7.xml><?xml version="1.0" encoding="utf-8"?>
-<p:notes xmlns:a="http://schemas.openxmlformats.org/drawingml/2006/main" xmlns:r="http://schemas.openxmlformats.org/officeDocument/2006/relationships" xmlns:p="http://schemas.openxmlformats.org/presentationml/2006/main" xmlns:m="http://schemas.openxmlformats.org/officeDocument/2006/math" xmlns:w="http://schemas.openxmlformats.org/wordprocessingml/2006/main">
-  <p:cSld name="">
-    <p:spTree>
-      <p:nvGrpSpPr>
-        <p:cNvPr id="1" name=""/>
-        <p:cNvGrpSpPr/>
-        <p:nvPr/>
-      </p:nvGrpSpPr>
-      <p:grpSpPr bwMode="auto">
-        <a:xfrm>
-          <a:off x="0" y="0"/>
-          <a:ext cx="0" cy="0"/>
-          <a:chOff x="0" y="0"/>
-          <a:chExt cx="0" cy="0"/>
-        </a:xfrm>
-      </p:grpSpPr>
-      <p:sp>
-        <p:nvSpPr>
-          <p:cNvPr id="2" name="Slide Image Placeholder 1"/>
-          <p:cNvSpPr>
-            <a:spLocks noChangeAspect="1" noGrp="1" noRot="1"/>
-          </p:cNvSpPr>
-          <p:nvPr>
-            <p:ph type="sldImg"/>
-          </p:nvPr>
-        </p:nvSpPr>
-        <p:spPr bwMode="auto"/>
-      </p:sp>
-      <p:sp>
-        <p:nvSpPr>
-          <p:cNvPr id="3" name="Notes Placeholder 2"/>
-          <p:cNvSpPr>
-            <a:spLocks noGrp="1"/>
-          </p:cNvSpPr>
-          <p:nvPr>
-            <p:ph type="body" idx="1"/>
-          </p:nvPr>
-        </p:nvSpPr>
-        <p:spPr bwMode="auto"/>
-        <p:txBody>
-          <a:bodyPr/>
-          <a:lstStyle/>
-          <a:p>
-            <a:pPr>
-              <a:defRPr/>
-            </a:pPr>
-            <a:endParaRPr/>
-          </a:p>
-        </p:txBody>
-      </p:sp>
-      <p:sp>
-        <p:nvSpPr>
-          <p:cNvPr id="4" name="Slide Number Placeholder 3"/>
-          <p:cNvSpPr>
-            <a:spLocks noGrp="1"/>
-          </p:cNvSpPr>
-          <p:nvPr>
-            <p:ph type="sldNum" sz="quarter" idx="10"/>
-          </p:nvPr>
-        </p:nvSpPr>
-        <p:spPr bwMode="auto"/>
-        <p:txBody>
-          <a:bodyPr/>
-          <a:lstStyle/>
-          <a:p>
-            <a:pPr>
-              <a:defRPr/>
-            </a:pPr>
-            <a:fld id="{C8204A06-6090-2181-5C30-A22E5B0F6429}" type="slidenum">
-              <a:rPr/>
-              <a:t/>
-            </a:fld>
-            <a:endParaRPr/>
-          </a:p>
-        </p:txBody>
-      </p:sp>
-    </p:spTree>
-  </p:cSld>
-</p:notes>
-</file>
-
-<file path=ppt/notesSlides/notesSlide8.xml><?xml version="1.0" encoding="utf-8"?>
-<p:notes xmlns:a="http://schemas.openxmlformats.org/drawingml/2006/main" xmlns:r="http://schemas.openxmlformats.org/officeDocument/2006/relationships" xmlns:p="http://schemas.openxmlformats.org/presentationml/2006/main" xmlns:m="http://schemas.openxmlformats.org/officeDocument/2006/math" xmlns:w="http://schemas.openxmlformats.org/wordprocessingml/2006/main">
-  <p:cSld name="">
-    <p:spTree>
-      <p:nvGrpSpPr>
-        <p:cNvPr id="1" name=""/>
-        <p:cNvGrpSpPr/>
-        <p:nvPr/>
-      </p:nvGrpSpPr>
-      <p:grpSpPr bwMode="auto">
-        <a:xfrm>
-          <a:off x="0" y="0"/>
-          <a:ext cx="0" cy="0"/>
-          <a:chOff x="0" y="0"/>
-          <a:chExt cx="0" cy="0"/>
-        </a:xfrm>
-      </p:grpSpPr>
-      <p:sp>
-        <p:nvSpPr>
-          <p:cNvPr id="2" name="Slide Image Placeholder 1"/>
-          <p:cNvSpPr>
-            <a:spLocks noChangeAspect="1" noGrp="1" noRot="1"/>
-          </p:cNvSpPr>
-          <p:nvPr>
-            <p:ph type="sldImg"/>
-          </p:nvPr>
-        </p:nvSpPr>
-        <p:spPr bwMode="auto"/>
-      </p:sp>
-      <p:sp>
-        <p:nvSpPr>
-          <p:cNvPr id="3" name="Notes Placeholder 2"/>
-          <p:cNvSpPr>
-            <a:spLocks noGrp="1"/>
-          </p:cNvSpPr>
-          <p:nvPr>
-            <p:ph type="body" idx="1"/>
-          </p:nvPr>
-        </p:nvSpPr>
-        <p:spPr bwMode="auto"/>
-        <p:txBody>
-          <a:bodyPr/>
-          <a:lstStyle/>
-          <a:p>
-            <a:pPr>
-              <a:defRPr/>
-            </a:pPr>
-            <a:endParaRPr/>
-          </a:p>
-        </p:txBody>
-      </p:sp>
-      <p:sp>
-        <p:nvSpPr>
-          <p:cNvPr id="4" name="Slide Number Placeholder 3"/>
-          <p:cNvSpPr>
-            <a:spLocks noGrp="1"/>
-          </p:cNvSpPr>
-          <p:nvPr>
-            <p:ph type="sldNum" sz="quarter" idx="10"/>
-          </p:nvPr>
-        </p:nvSpPr>
-        <p:spPr bwMode="auto"/>
-        <p:txBody>
-          <a:bodyPr/>
-          <a:lstStyle/>
-          <a:p>
-            <a:pPr>
-              <a:defRPr/>
-            </a:pPr>
-            <a:fld id="{8AE99FB8-DF52-0700-E11A-B085301736AE}" type="slidenum">
-              <a:rPr/>
-              <a:t/>
-            </a:fld>
-            <a:endParaRPr/>
-          </a:p>
-        </p:txBody>
-      </p:sp>
-    </p:spTree>
-  </p:cSld>
-</p:notes>
-</file>
-
-<file path=ppt/notesSlides/notesSlide9.xml><?xml version="1.0" encoding="utf-8"?>
-<p:notes xmlns:a="http://schemas.openxmlformats.org/drawingml/2006/main" xmlns:r="http://schemas.openxmlformats.org/officeDocument/2006/relationships" xmlns:p="http://schemas.openxmlformats.org/presentationml/2006/main" xmlns:m="http://schemas.openxmlformats.org/officeDocument/2006/math" xmlns:w="http://schemas.openxmlformats.org/wordprocessingml/2006/main">
-  <p:cSld name="">
-    <p:spTree>
-      <p:nvGrpSpPr>
-        <p:cNvPr id="1" name=""/>
-        <p:cNvGrpSpPr/>
-        <p:nvPr/>
-      </p:nvGrpSpPr>
-      <p:grpSpPr bwMode="auto">
-        <a:xfrm>
-          <a:off x="0" y="0"/>
-          <a:ext cx="0" cy="0"/>
-          <a:chOff x="0" y="0"/>
-          <a:chExt cx="0" cy="0"/>
-        </a:xfrm>
-      </p:grpSpPr>
-      <p:sp>
-        <p:nvSpPr>
-          <p:cNvPr id="2" name="Slide Image Placeholder 1"/>
-          <p:cNvSpPr>
-            <a:spLocks noChangeAspect="1" noGrp="1" noRot="1"/>
-          </p:cNvSpPr>
-          <p:nvPr>
-            <p:ph type="sldImg"/>
-          </p:nvPr>
-        </p:nvSpPr>
-        <p:spPr bwMode="auto"/>
-      </p:sp>
-      <p:sp>
-        <p:nvSpPr>
-          <p:cNvPr id="3" name="Notes Placeholder 2"/>
-          <p:cNvSpPr>
-            <a:spLocks noGrp="1"/>
-          </p:cNvSpPr>
-          <p:nvPr>
-            <p:ph type="body" idx="1"/>
-          </p:nvPr>
-        </p:nvSpPr>
-        <p:spPr bwMode="auto"/>
-        <p:txBody>
-          <a:bodyPr/>
-          <a:lstStyle/>
-          <a:p>
-            <a:pPr>
-              <a:defRPr/>
-            </a:pPr>
-            <a:endParaRPr/>
-          </a:p>
-        </p:txBody>
-      </p:sp>
-      <p:sp>
-        <p:nvSpPr>
-          <p:cNvPr id="4" name="Slide Number Placeholder 3"/>
-          <p:cNvSpPr>
-            <a:spLocks noGrp="1"/>
-          </p:cNvSpPr>
-          <p:nvPr>
-            <p:ph type="sldNum" sz="quarter" idx="10"/>
-          </p:nvPr>
-        </p:nvSpPr>
-        <p:spPr bwMode="auto"/>
-        <p:txBody>
-          <a:bodyPr/>
-          <a:lstStyle/>
-          <a:p>
-            <a:pPr>
-              <a:defRPr/>
-            </a:pPr>
-            <a:fld id="{2A142B38-23DC-9824-9E79-C7090351C1CE}" type="slidenum">
-              <a:rPr/>
-              <a:t/>
-            </a:fld>
-            <a:endParaRPr/>
-          </a:p>
-        </p:txBody>
-      </p:sp>
-    </p:spTree>
-  </p:cSld>
-</p:notes>
 </file>
 
 <file path=ppt/slideLayouts/slideLayout1.xml><?xml version="1.0" encoding="utf-8"?>
@@ -8649,7 +6686,7 @@
     <a:masterClrMapping/>
   </p:clrMapOvr>
   <mc:AlternateContent xmlns:mc="http://schemas.openxmlformats.org/markup-compatibility/2006">
-    <mc:Choice xmlns:p159="http://schemas.microsoft.com/office/powerpoint/2015/09/main" xmlns:p14="http://schemas.microsoft.com/office/powerpoint/2010/main" Requires="p159">
+    <mc:Choice xmlns:p14="http://schemas.microsoft.com/office/powerpoint/2010/main" Requires="p14">
       <p:transition p14:dur="2000" advClick="1"/>
     </mc:Choice>
     <mc:Fallback>
@@ -9801,7 +7838,7 @@
     <a:masterClrMapping/>
   </p:clrMapOvr>
   <mc:AlternateContent xmlns:mc="http://schemas.openxmlformats.org/markup-compatibility/2006">
-    <mc:Choice xmlns:p159="http://schemas.microsoft.com/office/powerpoint/2015/09/main" xmlns:p14="http://schemas.microsoft.com/office/powerpoint/2010/main" Requires="p159">
+    <mc:Choice xmlns:p14="http://schemas.microsoft.com/office/powerpoint/2010/main" Requires="p14">
       <p:transition p14:dur="2000" advClick="1"/>
     </mc:Choice>
     <mc:Fallback>
@@ -10709,7 +8746,7 @@
     <a:masterClrMapping/>
   </p:clrMapOvr>
   <mc:AlternateContent xmlns:mc="http://schemas.openxmlformats.org/markup-compatibility/2006">
-    <mc:Choice xmlns:p159="http://schemas.microsoft.com/office/powerpoint/2015/09/main" xmlns:p14="http://schemas.microsoft.com/office/powerpoint/2010/main" Requires="p159">
+    <mc:Choice xmlns:p14="http://schemas.microsoft.com/office/powerpoint/2010/main" Requires="p14">
       <p:transition p14:dur="2000" advClick="1"/>
     </mc:Choice>
     <mc:Fallback>
@@ -12130,7 +10167,7 @@
     <a:masterClrMapping/>
   </p:clrMapOvr>
   <mc:AlternateContent xmlns:mc="http://schemas.openxmlformats.org/markup-compatibility/2006">
-    <mc:Choice xmlns:p159="http://schemas.microsoft.com/office/powerpoint/2015/09/main" xmlns:p14="http://schemas.microsoft.com/office/powerpoint/2010/main" Requires="p159">
+    <mc:Choice xmlns:p14="http://schemas.microsoft.com/office/powerpoint/2010/main" Requires="p14">
       <p:transition p14:dur="2000" advClick="1"/>
     </mc:Choice>
     <mc:Fallback>
@@ -13192,7 +11229,7 @@
     <a:masterClrMapping/>
   </p:clrMapOvr>
   <mc:AlternateContent xmlns:mc="http://schemas.openxmlformats.org/markup-compatibility/2006">
-    <mc:Choice xmlns:p159="http://schemas.microsoft.com/office/powerpoint/2015/09/main" xmlns:p14="http://schemas.microsoft.com/office/powerpoint/2010/main" Requires="p159">
+    <mc:Choice xmlns:p14="http://schemas.microsoft.com/office/powerpoint/2010/main" Requires="p14">
       <p:transition p14:dur="2000" advClick="1"/>
     </mc:Choice>
     <mc:Fallback>
@@ -14091,7 +12128,7 @@
           <p:nvPr/>
         </p:nvPicPr>
         <p:blipFill>
-          <a:blip r:embed="rId3"/>
+          <a:blip r:embed="rId2"/>
           <a:stretch/>
         </p:blipFill>
         <p:spPr bwMode="auto">
@@ -14554,7 +12591,7 @@
     <a:masterClrMapping/>
   </p:clrMapOvr>
   <mc:AlternateContent xmlns:mc="http://schemas.openxmlformats.org/markup-compatibility/2006">
-    <mc:Choice xmlns:p159="http://schemas.microsoft.com/office/powerpoint/2015/09/main" xmlns:p14="http://schemas.microsoft.com/office/powerpoint/2010/main" Requires="p159">
+    <mc:Choice xmlns:p14="http://schemas.microsoft.com/office/powerpoint/2010/main" Requires="p14">
       <p:transition p14:dur="2000" advClick="1"/>
     </mc:Choice>
     <mc:Fallback>
@@ -15855,7 +13892,7 @@
     <a:masterClrMapping/>
   </p:clrMapOvr>
   <mc:AlternateContent xmlns:mc="http://schemas.openxmlformats.org/markup-compatibility/2006">
-    <mc:Choice xmlns:p159="http://schemas.microsoft.com/office/powerpoint/2015/09/main" xmlns:p14="http://schemas.microsoft.com/office/powerpoint/2010/main" Requires="p159">
+    <mc:Choice xmlns:p14="http://schemas.microsoft.com/office/powerpoint/2010/main" Requires="p14">
       <p:transition p14:dur="2000" advClick="1"/>
     </mc:Choice>
     <mc:Fallback>
@@ -17096,7 +15133,7 @@
     <a:masterClrMapping/>
   </p:clrMapOvr>
   <mc:AlternateContent xmlns:mc="http://schemas.openxmlformats.org/markup-compatibility/2006">
-    <mc:Choice xmlns:p159="http://schemas.microsoft.com/office/powerpoint/2015/09/main" xmlns:p14="http://schemas.microsoft.com/office/powerpoint/2010/main" Requires="p159">
+    <mc:Choice xmlns:p14="http://schemas.microsoft.com/office/powerpoint/2010/main" Requires="p14">
       <p:transition p14:dur="2000" advClick="1"/>
     </mc:Choice>
     <mc:Fallback>
@@ -17789,7 +15826,7 @@
     <a:masterClrMapping/>
   </p:clrMapOvr>
   <mc:AlternateContent xmlns:mc="http://schemas.openxmlformats.org/markup-compatibility/2006">
-    <mc:Choice xmlns:p159="http://schemas.microsoft.com/office/powerpoint/2015/09/main" xmlns:p14="http://schemas.microsoft.com/office/powerpoint/2010/main" Requires="p159">
+    <mc:Choice xmlns:p14="http://schemas.microsoft.com/office/powerpoint/2010/main" Requires="p14">
       <p:transition p14:dur="2000" advClick="1"/>
     </mc:Choice>
     <mc:Fallback>
@@ -18954,7 +16991,7 @@
     <a:masterClrMapping/>
   </p:clrMapOvr>
   <mc:AlternateContent xmlns:mc="http://schemas.openxmlformats.org/markup-compatibility/2006">
-    <mc:Choice xmlns:p159="http://schemas.microsoft.com/office/powerpoint/2015/09/main" xmlns:p14="http://schemas.microsoft.com/office/powerpoint/2010/main" Requires="p159">
+    <mc:Choice xmlns:p14="http://schemas.microsoft.com/office/powerpoint/2010/main" Requires="p14">
       <p:transition p14:dur="2000" advClick="1"/>
     </mc:Choice>
     <mc:Fallback>
@@ -19663,7 +17700,7 @@
     <a:masterClrMapping/>
   </p:clrMapOvr>
   <mc:AlternateContent xmlns:mc="http://schemas.openxmlformats.org/markup-compatibility/2006">
-    <mc:Choice xmlns:p159="http://schemas.microsoft.com/office/powerpoint/2015/09/main" xmlns:p14="http://schemas.microsoft.com/office/powerpoint/2010/main" Requires="p159">
+    <mc:Choice xmlns:p14="http://schemas.microsoft.com/office/powerpoint/2010/main" Requires="p14">
       <p:transition p14:dur="2000" advClick="1"/>
     </mc:Choice>
     <mc:Fallback>
@@ -19831,7 +17868,7 @@
           <p:nvPr/>
         </p:nvPicPr>
         <p:blipFill>
-          <a:blip r:embed="rId3"/>
+          <a:blip r:embed="rId2"/>
           <a:stretch/>
         </p:blipFill>
         <p:spPr bwMode="auto">
@@ -19854,7 +17891,7 @@
           <p:nvPr/>
         </p:nvPicPr>
         <p:blipFill>
-          <a:blip r:embed="rId4"/>
+          <a:blip r:embed="rId3"/>
           <a:stretch/>
         </p:blipFill>
         <p:spPr bwMode="auto">
@@ -19877,7 +17914,7 @@
           <p:nvPr/>
         </p:nvPicPr>
         <p:blipFill>
-          <a:blip r:embed="rId5"/>
+          <a:blip r:embed="rId4"/>
           <a:stretch/>
         </p:blipFill>
         <p:spPr bwMode="auto">
@@ -19900,7 +17937,7 @@
           <p:nvPr/>
         </p:nvPicPr>
         <p:blipFill>
-          <a:blip r:embed="rId6"/>
+          <a:blip r:embed="rId5"/>
           <a:srcRect l="0" t="1036" r="1006" b="2712"/>
           <a:stretch/>
         </p:blipFill>
@@ -20376,7 +18413,7 @@
     <a:masterClrMapping/>
   </p:clrMapOvr>
   <mc:AlternateContent xmlns:mc="http://schemas.openxmlformats.org/markup-compatibility/2006">
-    <mc:Choice xmlns:p159="http://schemas.microsoft.com/office/powerpoint/2015/09/main" xmlns:p14="http://schemas.microsoft.com/office/powerpoint/2010/main" Requires="p159">
+    <mc:Choice xmlns:p14="http://schemas.microsoft.com/office/powerpoint/2010/main" Requires="p14">
       <p:transition p14:dur="2000" advClick="1"/>
     </mc:Choice>
     <mc:Fallback>
@@ -20476,7 +18513,7 @@
           <p:nvPr/>
         </p:nvPicPr>
         <p:blipFill>
-          <a:blip r:embed="rId3"/>
+          <a:blip r:embed="rId2"/>
           <a:stretch/>
         </p:blipFill>
         <p:spPr bwMode="auto">
@@ -20498,7 +18535,7 @@
           <p:nvPr/>
         </p:nvPicPr>
         <p:blipFill>
-          <a:blip r:embed="rId4"/>
+          <a:blip r:embed="rId3"/>
           <a:stretch/>
         </p:blipFill>
         <p:spPr bwMode="auto">
@@ -20795,7 +18832,7 @@
     <a:masterClrMapping/>
   </p:clrMapOvr>
   <mc:AlternateContent xmlns:mc="http://schemas.openxmlformats.org/markup-compatibility/2006">
-    <mc:Choice xmlns:p159="http://schemas.microsoft.com/office/powerpoint/2015/09/main" xmlns:p14="http://schemas.microsoft.com/office/powerpoint/2010/main" Requires="p159">
+    <mc:Choice xmlns:p14="http://schemas.microsoft.com/office/powerpoint/2010/main" Requires="p14">
       <p:transition p14:dur="2000" advClick="1"/>
     </mc:Choice>
     <mc:Fallback>
@@ -20912,7 +18949,7 @@
           <p:nvPr/>
         </p:nvPicPr>
         <p:blipFill>
-          <a:blip r:embed="rId3"/>
+          <a:blip r:embed="rId2"/>
           <a:stretch/>
         </p:blipFill>
         <p:spPr bwMode="auto">
@@ -21202,7 +19239,7 @@
           <p:nvPr/>
         </p:nvPicPr>
         <p:blipFill>
-          <a:blip r:embed="rId4"/>
+          <a:blip r:embed="rId3"/>
           <a:stretch/>
         </p:blipFill>
         <p:spPr bwMode="auto">
@@ -21391,7 +19428,7 @@
     <a:masterClrMapping/>
   </p:clrMapOvr>
   <mc:AlternateContent xmlns:mc="http://schemas.openxmlformats.org/markup-compatibility/2006">
-    <mc:Choice xmlns:p159="http://schemas.microsoft.com/office/powerpoint/2015/09/main" xmlns:p14="http://schemas.microsoft.com/office/powerpoint/2010/main" Requires="p159">
+    <mc:Choice xmlns:p14="http://schemas.microsoft.com/office/powerpoint/2010/main" Requires="p14">
       <p:transition p14:dur="2000" advClick="1"/>
     </mc:Choice>
     <mc:Fallback>
@@ -21508,7 +19545,7 @@
           <p:nvPr/>
         </p:nvPicPr>
         <p:blipFill>
-          <a:blip r:embed="rId3"/>
+          <a:blip r:embed="rId2"/>
           <a:stretch/>
         </p:blipFill>
         <p:spPr bwMode="auto">
@@ -21531,7 +19568,7 @@
           <p:nvPr/>
         </p:nvPicPr>
         <p:blipFill>
-          <a:blip r:embed="rId4"/>
+          <a:blip r:embed="rId3"/>
           <a:stretch/>
         </p:blipFill>
         <p:spPr bwMode="auto">
@@ -21847,7 +19884,7 @@
           <p:nvPr/>
         </p:nvPicPr>
         <p:blipFill>
-          <a:blip r:embed="rId5"/>
+          <a:blip r:embed="rId4"/>
           <a:stretch/>
         </p:blipFill>
         <p:spPr bwMode="auto">
@@ -21870,7 +19907,7 @@
           <p:nvPr/>
         </p:nvPicPr>
         <p:blipFill>
-          <a:blip r:embed="rId6"/>
+          <a:blip r:embed="rId5"/>
           <a:stretch/>
         </p:blipFill>
         <p:spPr bwMode="auto">
@@ -21893,7 +19930,7 @@
           <p:nvPr/>
         </p:nvPicPr>
         <p:blipFill>
-          <a:blip r:embed="rId7"/>
+          <a:blip r:embed="rId6"/>
           <a:stretch/>
         </p:blipFill>
         <p:spPr bwMode="auto">
@@ -22051,7 +20088,7 @@
     <a:masterClrMapping/>
   </p:clrMapOvr>
   <mc:AlternateContent xmlns:mc="http://schemas.openxmlformats.org/markup-compatibility/2006">
-    <mc:Choice xmlns:p159="http://schemas.microsoft.com/office/powerpoint/2015/09/main" xmlns:p14="http://schemas.microsoft.com/office/powerpoint/2010/main" Requires="p159">
+    <mc:Choice xmlns:p14="http://schemas.microsoft.com/office/powerpoint/2010/main" Requires="p14">
       <p:transition p14:dur="2000" advClick="1"/>
     </mc:Choice>
     <mc:Fallback>
@@ -22085,7 +20122,7 @@
           <p:nvPr/>
         </p:nvPicPr>
         <p:blipFill>
-          <a:blip r:embed="rId3"/>
+          <a:blip r:embed="rId2"/>
           <a:stretch/>
         </p:blipFill>
         <p:spPr bwMode="auto">
@@ -23550,7 +21587,7 @@
     <a:masterClrMapping/>
   </p:clrMapOvr>
   <mc:AlternateContent xmlns:mc="http://schemas.openxmlformats.org/markup-compatibility/2006">
-    <mc:Choice xmlns:p159="http://schemas.microsoft.com/office/powerpoint/2015/09/main" xmlns:p14="http://schemas.microsoft.com/office/powerpoint/2010/main" Requires="p159">
+    <mc:Choice xmlns:p14="http://schemas.microsoft.com/office/powerpoint/2010/main" Requires="p14">
       <p:transition p14:dur="2000" advClick="1"/>
     </mc:Choice>
     <mc:Fallback>
@@ -23907,7 +21944,7 @@
           <p:nvPr/>
         </p:nvPicPr>
         <p:blipFill>
-          <a:blip r:embed="rId3"/>
+          <a:blip r:embed="rId2"/>
           <a:stretch/>
         </p:blipFill>
         <p:spPr bwMode="auto">
@@ -23930,7 +21967,7 @@
           <p:nvPr/>
         </p:nvPicPr>
         <p:blipFill>
-          <a:blip r:embed="rId4"/>
+          <a:blip r:embed="rId3"/>
           <a:stretch/>
         </p:blipFill>
         <p:spPr bwMode="auto">
@@ -23988,7 +22025,7 @@
     <a:masterClrMapping/>
   </p:clrMapOvr>
   <mc:AlternateContent xmlns:mc="http://schemas.openxmlformats.org/markup-compatibility/2006">
-    <mc:Choice xmlns:p159="http://schemas.microsoft.com/office/powerpoint/2015/09/main" xmlns:p14="http://schemas.microsoft.com/office/powerpoint/2010/main" Requires="p159">
+    <mc:Choice xmlns:p14="http://schemas.microsoft.com/office/powerpoint/2010/main" Requires="p14">
       <p:transition p14:dur="2000" advClick="1"/>
     </mc:Choice>
     <mc:Fallback>
@@ -24082,7 +22119,7 @@
             </a:endParaRPr>
           </a:p>
           <a:p>
-            <a:pPr marL="706318" lvl="1" indent="-305908">
+            <a:pPr marL="343080" indent="-342720">
               <a:lnSpc>
                 <a:spcPct val="100000"/>
               </a:lnSpc>
@@ -24093,11 +22130,8 @@
                 <a:srgbClr val="90C226"/>
               </a:buClr>
               <a:buSzPct val="80000"/>
-              <a:buFont typeface="Arial"/>
-              <a:buChar char="•"/>
-              <a:tabLst>
-                <a:tab pos="7020000" algn="l"/>
-              </a:tabLst>
+              <a:buFont typeface="Wingdings"/>
+              <a:buChar char=""/>
               <a:defRPr/>
             </a:pPr>
             <a:r>
@@ -24118,7 +22152,7 @@
             </a:endParaRPr>
           </a:p>
           <a:p>
-            <a:pPr marL="706318" lvl="1" indent="-305908">
+            <a:pPr marL="343080" indent="-342720">
               <a:lnSpc>
                 <a:spcPct val="100000"/>
               </a:lnSpc>
@@ -24129,11 +22163,8 @@
                 <a:srgbClr val="90C226"/>
               </a:buClr>
               <a:buSzPct val="80000"/>
-              <a:buFont typeface="Arial"/>
-              <a:buChar char="•"/>
-              <a:tabLst>
-                <a:tab pos="7020000" algn="l"/>
-              </a:tabLst>
+              <a:buFont typeface="Wingdings"/>
+              <a:buChar char=""/>
               <a:defRPr/>
             </a:pPr>
             <a:r>
@@ -24154,7 +22185,7 @@
             </a:endParaRPr>
           </a:p>
           <a:p>
-            <a:pPr marL="706318" lvl="1" indent="-305908">
+            <a:pPr marL="343080" indent="-342720">
               <a:lnSpc>
                 <a:spcPct val="100000"/>
               </a:lnSpc>
@@ -24165,11 +22196,8 @@
                 <a:srgbClr val="90C226"/>
               </a:buClr>
               <a:buSzPct val="80000"/>
-              <a:buFont typeface="Arial"/>
-              <a:buChar char="•"/>
-              <a:tabLst>
-                <a:tab pos="7020000" algn="l"/>
-              </a:tabLst>
+              <a:buFont typeface="Wingdings"/>
+              <a:buChar char=""/>
               <a:defRPr/>
             </a:pPr>
             <a:r>
@@ -24261,7 +22289,7 @@
           <p:nvPr/>
         </p:nvPicPr>
         <p:blipFill>
-          <a:blip r:embed="rId3"/>
+          <a:blip r:embed="rId2"/>
           <a:stretch/>
         </p:blipFill>
         <p:spPr bwMode="auto">
@@ -24475,7 +22503,7 @@
     <a:masterClrMapping/>
   </p:clrMapOvr>
   <mc:AlternateContent xmlns:mc="http://schemas.openxmlformats.org/markup-compatibility/2006">
-    <mc:Choice xmlns:p159="http://schemas.microsoft.com/office/powerpoint/2015/09/main" xmlns:p14="http://schemas.microsoft.com/office/powerpoint/2010/main" Requires="p159">
+    <mc:Choice xmlns:p14="http://schemas.microsoft.com/office/powerpoint/2010/main" Requires="p14">
       <p:transition p14:dur="2000" advClick="1"/>
     </mc:Choice>
     <mc:Fallback>
@@ -24608,7 +22636,7 @@
                 <a:gridCol w="2328120"/>
                 <a:gridCol w="2298600"/>
               </a:tblGrid>
-              <a:tr h="1296383">
+              <a:tr h="1153080">
                 <a:tc>
                   <a:txBody>
                     <a:bodyPr/>
@@ -24949,7 +22977,7 @@
                   </a:tcPr>
                 </a:tc>
               </a:tr>
-              <a:tr h="670593">
+              <a:tr h="357120">
                 <a:tc>
                   <a:txBody>
                     <a:bodyPr/>
@@ -25146,7 +23174,7 @@
                   </a:tcPr>
                 </a:tc>
               </a:tr>
-              <a:tr h="658365">
+              <a:tr h="622440">
                 <a:tc>
                   <a:txBody>
                     <a:bodyPr/>
@@ -25343,7 +23371,7 @@
                   </a:tcPr>
                 </a:tc>
               </a:tr>
-              <a:tr h="658365">
+              <a:tr h="357120">
                 <a:tc>
                   <a:txBody>
                     <a:bodyPr/>
@@ -25364,22 +23392,7 @@
                         </a:rPr>
                         <a:t>Читаемость кода</a:t>
                       </a:r>
-                      <a:endParaRPr lang="ru-RU" sz="1800" b="0" strike="noStrike" spc="0">
-                        <a:solidFill>
-                          <a:srgbClr val="000000"/>
-                        </a:solidFill>
-                        <a:latin typeface="Trebuchet MS"/>
-                        <a:ea typeface="Arial"/>
-                      </a:endParaRPr>
-                    </a:p>
-                    <a:p>
-                      <a:pPr>
-                        <a:lnSpc>
-                          <a:spcPct val="100000"/>
-                        </a:lnSpc>
-                        <a:defRPr/>
-                      </a:pPr>
-                      <a:endParaRPr lang="en-US" sz="1800" b="0" strike="noStrike" spc="0">
+                      <a:endParaRPr lang="en-US" sz="1800" b="0" strike="noStrike" spc="-1">
                         <a:latin typeface="Arial"/>
                       </a:endParaRPr>
                     </a:p>
@@ -25566,12 +23579,12 @@
           <p:nvPr/>
         </p:nvPicPr>
         <p:blipFill>
-          <a:blip r:embed="rId3"/>
+          <a:blip r:embed="rId2"/>
           <a:stretch/>
         </p:blipFill>
         <p:spPr bwMode="auto">
           <a:xfrm>
-            <a:off x="5938199" y="2218320"/>
+            <a:off x="5938200" y="2218320"/>
             <a:ext cx="409320" cy="467640"/>
           </a:xfrm>
           <a:prstGeom prst="rect">
@@ -25589,7 +23602,7 @@
           <p:nvPr/>
         </p:nvPicPr>
         <p:blipFill>
-          <a:blip r:embed="rId4"/>
+          <a:blip r:embed="rId3"/>
           <a:stretch/>
         </p:blipFill>
         <p:spPr bwMode="auto">
@@ -25612,7 +23625,7 @@
           <p:nvPr/>
         </p:nvPicPr>
         <p:blipFill>
-          <a:blip r:embed="rId4"/>
+          <a:blip r:embed="rId3"/>
           <a:stretch/>
         </p:blipFill>
         <p:spPr bwMode="auto">
@@ -25630,7 +23643,7 @@
       </p:pic>
       <p:pic>
         <p:nvPicPr>
-          <p:cNvPr id="175" name="Рисунок 9"/>
+          <p:cNvPr id="174" name="Рисунок 8"/>
           <p:cNvPicPr/>
           <p:nvPr/>
         </p:nvPicPr>
@@ -25640,7 +23653,30 @@
         </p:blipFill>
         <p:spPr bwMode="auto">
           <a:xfrm>
-            <a:off x="5938199" y="2895840"/>
+            <a:off x="10579320" y="2218320"/>
+            <a:ext cx="518760" cy="518760"/>
+          </a:xfrm>
+          <a:prstGeom prst="rect">
+            <a:avLst/>
+          </a:prstGeom>
+          <a:ln>
+            <a:noFill/>
+          </a:ln>
+        </p:spPr>
+      </p:pic>
+      <p:pic>
+        <p:nvPicPr>
+          <p:cNvPr id="175" name="Рисунок 9"/>
+          <p:cNvPicPr/>
+          <p:nvPr/>
+        </p:nvPicPr>
+        <p:blipFill>
+          <a:blip r:embed="rId2"/>
+          <a:stretch/>
+        </p:blipFill>
+        <p:spPr bwMode="auto">
+          <a:xfrm>
+            <a:off x="5938200" y="2895840"/>
             <a:ext cx="409320" cy="467640"/>
           </a:xfrm>
           <a:prstGeom prst="rect">
@@ -25658,12 +23694,12 @@
           <p:nvPr/>
         </p:nvPicPr>
         <p:blipFill>
-          <a:blip r:embed="rId3"/>
+          <a:blip r:embed="rId2"/>
           <a:stretch/>
         </p:blipFill>
         <p:spPr bwMode="auto">
           <a:xfrm>
-            <a:off x="10678320" y="2980071"/>
+            <a:off x="10678320" y="2844000"/>
             <a:ext cx="409320" cy="467640"/>
           </a:xfrm>
           <a:prstGeom prst="rect">
@@ -25681,12 +23717,12 @@
           <p:nvPr/>
         </p:nvPicPr>
         <p:blipFill>
-          <a:blip r:embed="rId3"/>
+          <a:blip r:embed="rId2"/>
           <a:stretch/>
         </p:blipFill>
         <p:spPr bwMode="auto">
           <a:xfrm>
-            <a:off x="8279280" y="2865599"/>
+            <a:off x="8279280" y="2865600"/>
             <a:ext cx="409320" cy="467640"/>
           </a:xfrm>
           <a:prstGeom prst="rect">
@@ -25704,7 +23740,7 @@
           <p:nvPr/>
         </p:nvPicPr>
         <p:blipFill>
-          <a:blip r:embed="rId4"/>
+          <a:blip r:embed="rId3"/>
           <a:stretch/>
         </p:blipFill>
         <p:spPr bwMode="auto">
@@ -25727,13 +23763,13 @@
           <p:nvPr/>
         </p:nvPicPr>
         <p:blipFill>
-          <a:blip r:embed="rId5"/>
+          <a:blip r:embed="rId4"/>
           <a:stretch/>
         </p:blipFill>
         <p:spPr bwMode="auto">
-          <a:xfrm flipH="0" flipV="0">
-            <a:off x="5815079" y="3489119"/>
-            <a:ext cx="664705" cy="768960"/>
+          <a:xfrm>
+            <a:off x="5815080" y="3489120"/>
+            <a:ext cx="747000" cy="808560"/>
           </a:xfrm>
           <a:prstGeom prst="rect">
             <a:avLst/>
@@ -25750,13 +23786,13 @@
           <p:nvPr/>
         </p:nvPicPr>
         <p:blipFill>
-          <a:blip r:embed="rId6"/>
+          <a:blip r:embed="rId5"/>
           <a:stretch/>
         </p:blipFill>
         <p:spPr bwMode="auto">
-          <a:xfrm flipH="0" flipV="0">
-            <a:off x="3599271" y="3525111"/>
-            <a:ext cx="627839" cy="635065"/>
+          <a:xfrm>
+            <a:off x="3463200" y="3528720"/>
+            <a:ext cx="736920" cy="729360"/>
           </a:xfrm>
           <a:prstGeom prst="rect">
             <a:avLst/>
@@ -25773,13 +23809,13 @@
           <p:nvPr/>
         </p:nvPicPr>
         <p:blipFill>
-          <a:blip r:embed="rId7"/>
+          <a:blip r:embed="rId6"/>
           <a:stretch/>
         </p:blipFill>
         <p:spPr bwMode="auto">
-          <a:xfrm flipH="0" flipV="0">
-            <a:off x="8034120" y="3588831"/>
-            <a:ext cx="654480" cy="692982"/>
+          <a:xfrm>
+            <a:off x="8034120" y="3452760"/>
+            <a:ext cx="824400" cy="849240"/>
           </a:xfrm>
           <a:prstGeom prst="rect">
             <a:avLst/>
@@ -26010,36 +24046,13 @@
           <p:nvPr/>
         </p:nvPicPr>
         <p:blipFill>
-          <a:blip r:embed="rId8"/>
-          <a:stretch/>
-        </p:blipFill>
-        <p:spPr bwMode="auto">
-          <a:xfrm flipH="0" flipV="0">
-            <a:off x="10504431" y="3588831"/>
-            <a:ext cx="601782" cy="636128"/>
-          </a:xfrm>
-          <a:prstGeom prst="rect">
-            <a:avLst/>
-          </a:prstGeom>
-          <a:ln>
-            <a:noFill/>
-          </a:ln>
-        </p:spPr>
-      </p:pic>
-      <p:pic>
-        <p:nvPicPr>
-          <p:cNvPr id="2038608995" name="Рисунок 10"/>
-          <p:cNvPicPr/>
-          <p:nvPr/>
-        </p:nvPicPr>
-        <p:blipFill>
-          <a:blip r:embed="rId3"/>
+          <a:blip r:embed="rId7"/>
           <a:stretch/>
         </p:blipFill>
         <p:spPr bwMode="auto">
           <a:xfrm>
-            <a:off x="10694648" y="2316042"/>
-            <a:ext cx="409320" cy="467640"/>
+            <a:off x="10368360" y="3488760"/>
+            <a:ext cx="729720" cy="736200"/>
           </a:xfrm>
           <a:prstGeom prst="rect">
             <a:avLst/>
@@ -26055,7 +24068,7 @@
     <a:masterClrMapping/>
   </p:clrMapOvr>
   <mc:AlternateContent xmlns:mc="http://schemas.openxmlformats.org/markup-compatibility/2006">
-    <mc:Choice xmlns:p159="http://schemas.microsoft.com/office/powerpoint/2015/09/main" xmlns:p14="http://schemas.microsoft.com/office/powerpoint/2010/main" Requires="p159">
+    <mc:Choice xmlns:p14="http://schemas.microsoft.com/office/powerpoint/2010/main" Requires="p14">
       <p:transition p14:dur="2000" advClick="1"/>
     </mc:Choice>
     <mc:Fallback>
@@ -26247,6 +24260,7 @@
                       <a:solidFill>
                         <a:srgbClr val="FFFFFF"/>
                       </a:solidFill>
+                      <a:round/>
                     </a:lnL>
                     <a:lnR w="12240" algn="ctr">
                       <a:solidFill>
@@ -26298,6 +24312,7 @@
                       <a:solidFill>
                         <a:srgbClr val="FFFFFF"/>
                       </a:solidFill>
+                      <a:round/>
                     </a:lnL>
                     <a:lnR w="12240" algn="ctr">
                       <a:solidFill>
@@ -26367,6 +24382,7 @@
                       <a:solidFill>
                         <a:srgbClr val="FFFFFF"/>
                       </a:solidFill>
+                      <a:round/>
                     </a:lnB>
                     <a:solidFill>
                       <a:srgbClr val="90C226"/>
@@ -26477,6 +24493,7 @@
                       <a:solidFill>
                         <a:srgbClr val="FFFFFF"/>
                       </a:solidFill>
+                      <a:round/>
                     </a:lnB>
                     <a:solidFill>
                       <a:srgbClr val="DBE9CC"/>
@@ -26606,6 +24623,7 @@
                       <a:solidFill>
                         <a:srgbClr val="FFFFFF"/>
                       </a:solidFill>
+                      <a:round/>
                     </a:lnB>
                     <a:solidFill>
                       <a:srgbClr val="DBE9CC"/>
@@ -26650,6 +24668,7 @@
                       <a:solidFill>
                         <a:srgbClr val="FFFFFF"/>
                       </a:solidFill>
+                      <a:round/>
                     </a:lnR>
                     <a:lnT w="38160" algn="ctr">
                       <a:solidFill>
@@ -26744,6 +24763,7 @@
                       <a:solidFill>
                         <a:srgbClr val="FFFFFF"/>
                       </a:solidFill>
+                      <a:round/>
                     </a:lnB>
                     <a:solidFill>
                       <a:srgbClr val="EEF4E7"/>
@@ -26806,6 +24826,7 @@
                       <a:solidFill>
                         <a:srgbClr val="FFFFFF"/>
                       </a:solidFill>
+                      <a:round/>
                     </a:lnR>
                     <a:lnT w="12240" algn="ctr">
                       <a:solidFill>
@@ -26852,6 +24873,7 @@
                       <a:solidFill>
                         <a:srgbClr val="FFFFFF"/>
                       </a:solidFill>
+                      <a:round/>
                     </a:lnL>
                     <a:lnR w="12240" algn="ctr">
                       <a:solidFill>
@@ -26967,6 +24989,7 @@
                       <a:solidFill>
                         <a:srgbClr val="FFFFFF"/>
                       </a:solidFill>
+                      <a:round/>
                     </a:lnR>
                     <a:lnT w="12240" algn="ctr">
                       <a:solidFill>
@@ -27080,6 +25103,7 @@
                       <a:solidFill>
                         <a:srgbClr val="FFFFFF"/>
                       </a:solidFill>
+                      <a:round/>
                     </a:lnT>
                     <a:lnB w="12240" algn="ctr">
                       <a:solidFill>
@@ -27134,6 +25158,7 @@
                       <a:solidFill>
                         <a:srgbClr val="FFFFFF"/>
                       </a:solidFill>
+                      <a:round/>
                     </a:lnT>
                     <a:lnB w="12240" algn="ctr">
                       <a:solidFill>
@@ -27249,6 +25274,7 @@
                       <a:solidFill>
                         <a:srgbClr val="FFFFFF"/>
                       </a:solidFill>
+                      <a:round/>
                     </a:lnB>
                     <a:solidFill>
                       <a:srgbClr val="EEF4E7"/>
@@ -27352,6 +25378,7 @@
                       <a:solidFill>
                         <a:srgbClr val="FFFFFF"/>
                       </a:solidFill>
+                      <a:round/>
                     </a:lnT>
                     <a:lnB w="12240" algn="ctr">
                       <a:solidFill>
@@ -27411,6 +25438,7 @@
                       <a:solidFill>
                         <a:srgbClr val="FFFFFF"/>
                       </a:solidFill>
+                      <a:round/>
                     </a:lnB>
                     <a:solidFill>
                       <a:srgbClr val="EEF4E7"/>
@@ -27428,7 +25456,7 @@
     <a:masterClrMapping/>
   </p:clrMapOvr>
   <mc:AlternateContent xmlns:mc="http://schemas.openxmlformats.org/markup-compatibility/2006">
-    <mc:Choice xmlns:p159="http://schemas.microsoft.com/office/powerpoint/2015/09/main" xmlns:p14="http://schemas.microsoft.com/office/powerpoint/2010/main" Requires="p159">
+    <mc:Choice xmlns:p14="http://schemas.microsoft.com/office/powerpoint/2010/main" Requires="p14">
       <p:transition p14:dur="2000" advClick="1"/>
     </mc:Choice>
     <mc:Fallback>
@@ -27860,216 +25888,4 @@
   </a:themeElements>
   <a:objectDefaults/>
 </a:theme>
-</file>
-
-<file path=ppt/theme/theme3.xml><?xml version="1.0" encoding="utf-8"?>
-<a:theme xmlns:a="http://schemas.openxmlformats.org/drawingml/2006/main" xmlns:r="http://schemas.openxmlformats.org/officeDocument/2006/relationships" xmlns:p="http://schemas.openxmlformats.org/presentationml/2006/main" name="Office Theme">
-  <a:themeElements>
-    <a:clrScheme name="Office">
-      <a:dk1>
-        <a:sysClr val="windowText" lastClr="000000"/>
-      </a:dk1>
-      <a:lt1>
-        <a:sysClr val="window" lastClr="FFFFFF"/>
-      </a:lt1>
-      <a:dk2>
-        <a:srgbClr val="2C3C43"/>
-      </a:dk2>
-      <a:lt2>
-        <a:srgbClr val="EBEBEB"/>
-      </a:lt2>
-      <a:accent1>
-        <a:srgbClr val="90C226"/>
-      </a:accent1>
-      <a:accent2>
-        <a:srgbClr val="54A021"/>
-      </a:accent2>
-      <a:accent3>
-        <a:srgbClr val="E6B91E"/>
-      </a:accent3>
-      <a:accent4>
-        <a:srgbClr val="E76618"/>
-      </a:accent4>
-      <a:accent5>
-        <a:srgbClr val="C42F1A"/>
-      </a:accent5>
-      <a:accent6>
-        <a:srgbClr val="918655"/>
-      </a:accent6>
-      <a:hlink>
-        <a:srgbClr val="99CA3C"/>
-      </a:hlink>
-      <a:folHlink>
-        <a:srgbClr val="B9D181"/>
-      </a:folHlink>
-    </a:clrScheme>
-    <a:fontScheme name="">
-      <a:majorFont>
-        <a:latin typeface="Arial"/>
-        <a:ea typeface="DejaVu Sans"/>
-        <a:cs typeface="DejaVu Sans"/>
-      </a:majorFont>
-      <a:minorFont>
-        <a:latin typeface="Arial"/>
-        <a:ea typeface="DejaVu Sans"/>
-        <a:cs typeface="DejaVu Sans"/>
-      </a:minorFont>
-    </a:fontScheme>
-    <a:fmtScheme name="Office">
-      <a:fillStyleLst>
-        <a:solidFill>
-          <a:schemeClr val="phClr"/>
-        </a:solidFill>
-        <a:gradFill>
-          <a:gsLst>
-            <a:gs pos="0">
-              <a:schemeClr val="phClr">
-                <a:tint val="50000"/>
-                <a:satMod val="300000"/>
-              </a:schemeClr>
-            </a:gs>
-            <a:gs pos="35000">
-              <a:schemeClr val="phClr">
-                <a:tint val="37000"/>
-                <a:satMod val="300000"/>
-              </a:schemeClr>
-            </a:gs>
-            <a:gs pos="100000">
-              <a:schemeClr val="phClr">
-                <a:tint val="15000"/>
-                <a:satMod val="350000"/>
-              </a:schemeClr>
-            </a:gs>
-          </a:gsLst>
-          <a:lin ang="16200000" scaled="1"/>
-        </a:gradFill>
-        <a:gradFill>
-          <a:gsLst>
-            <a:gs pos="0">
-              <a:schemeClr val="phClr">
-                <a:shade val="51000"/>
-                <a:satMod val="130000"/>
-              </a:schemeClr>
-            </a:gs>
-            <a:gs pos="80000">
-              <a:schemeClr val="phClr">
-                <a:shade val="93000"/>
-                <a:satMod val="130000"/>
-              </a:schemeClr>
-            </a:gs>
-            <a:gs pos="100000">
-              <a:schemeClr val="phClr">
-                <a:shade val="94000"/>
-                <a:satMod val="135000"/>
-              </a:schemeClr>
-            </a:gs>
-          </a:gsLst>
-          <a:lin ang="16200000" scaled="0"/>
-        </a:gradFill>
-      </a:fillStyleLst>
-      <a:lnStyleLst>
-        <a:ln w="9525" cap="flat" cmpd="sng" algn="ctr">
-          <a:solidFill>
-            <a:schemeClr val="phClr">
-              <a:shade val="95000"/>
-              <a:satMod val="105000"/>
-            </a:schemeClr>
-          </a:solidFill>
-          <a:prstDash val="solid"/>
-          <a:miter/>
-        </a:ln>
-        <a:ln w="25400" cap="flat" cmpd="sng" algn="ctr">
-          <a:solidFill>
-            <a:schemeClr val="phClr"/>
-          </a:solidFill>
-          <a:prstDash val="solid"/>
-          <a:miter/>
-        </a:ln>
-        <a:ln w="38100" cap="flat" cmpd="sng" algn="ctr">
-          <a:solidFill>
-            <a:schemeClr val="phClr"/>
-          </a:solidFill>
-          <a:prstDash val="solid"/>
-          <a:miter/>
-        </a:ln>
-      </a:lnStyleLst>
-      <a:effectStyleLst>
-        <a:effectStyle>
-          <a:effectLst>
-            <a:outerShdw blurRad="40000" dist="20000" dir="5400000" rotWithShape="0">
-              <a:srgbClr val="000000">
-                <a:alpha val="38000"/>
-              </a:srgbClr>
-            </a:outerShdw>
-          </a:effectLst>
-        </a:effectStyle>
-        <a:effectStyle>
-          <a:effectLst>
-            <a:outerShdw blurRad="40000" dist="23000" dir="5400000" rotWithShape="0">
-              <a:srgbClr val="000000">
-                <a:alpha val="35000"/>
-              </a:srgbClr>
-            </a:outerShdw>
-          </a:effectLst>
-        </a:effectStyle>
-        <a:effectStyle>
-          <a:effectLst>
-            <a:outerShdw blurRad="40000" dist="23000" dir="5400000" rotWithShape="0">
-              <a:srgbClr val="000000">
-                <a:alpha val="35000"/>
-              </a:srgbClr>
-            </a:outerShdw>
-          </a:effectLst>
-        </a:effectStyle>
-      </a:effectStyleLst>
-      <a:bgFillStyleLst>
-        <a:solidFill>
-          <a:schemeClr val="phClr"/>
-        </a:solidFill>
-        <a:gradFill>
-          <a:gsLst>
-            <a:gs pos="0">
-              <a:schemeClr val="phClr">
-                <a:tint val="40000"/>
-                <a:satMod val="350000"/>
-              </a:schemeClr>
-            </a:gs>
-            <a:gs pos="40000">
-              <a:schemeClr val="phClr">
-                <a:tint val="45000"/>
-                <a:shade val="99000"/>
-                <a:satMod val="350000"/>
-              </a:schemeClr>
-            </a:gs>
-            <a:gs pos="100000">
-              <a:schemeClr val="phClr">
-                <a:shade val="20000"/>
-                <a:satMod val="255000"/>
-              </a:schemeClr>
-            </a:gs>
-          </a:gsLst>
-          <a:path path="circle"/>
-        </a:gradFill>
-        <a:gradFill>
-          <a:gsLst>
-            <a:gs pos="0">
-              <a:schemeClr val="phClr">
-                <a:tint val="80000"/>
-                <a:satMod val="300000"/>
-              </a:schemeClr>
-            </a:gs>
-            <a:gs pos="100000">
-              <a:schemeClr val="phClr">
-                <a:shade val="30000"/>
-                <a:satMod val="200000"/>
-              </a:schemeClr>
-            </a:gs>
-          </a:gsLst>
-          <a:path path="circle"/>
-        </a:gradFill>
-      </a:bgFillStyleLst>
-    </a:fmtScheme>
-  </a:themeElements>
-  <a:objectDefaults/>
-</a:theme>
 </file>
</xml_diff>